<commit_message>
Création backoffice user, category et article
Création des controllers pour les users, les catégories et les articles
Modification du style de la page de connexion
</commit_message>
<xml_diff>
--- a/Presentation_oral_LIEUTAUD_CELINE.pptx
+++ b/Presentation_oral_LIEUTAUD_CELINE.pptx
@@ -111,6 +111,11 @@
       </a:defRPr>
     </a:lvl9pPr>
   </p:defaultTextStyle>
+  <p:extLst>
+    <p:ext uri="{EFAFB233-063F-42B5-8137-9DF3F51BA10A}">
+      <p15:sldGuideLst xmlns:p15="http://schemas.microsoft.com/office/powerpoint/2012/main"/>
+    </p:ext>
+  </p:extLst>
 </p:presentation>
 </file>
 
@@ -3003,7 +3008,7 @@
           <a:p>
             <a:fld id="{55DE3638-8134-4337-8A69-795DC6005521}" type="datetimeFigureOut">
               <a:rPr lang="fr-FR" smtClean="0"/>
-              <a:t>12/04/2021</a:t>
+              <a:t>19/04/2021</a:t>
             </a:fld>
             <a:endParaRPr lang="fr-FR"/>
           </a:p>
@@ -3436,7 +3441,7 @@
           <a:p>
             <a:fld id="{72EA7947-E287-4738-8C82-07CE4F01EF03}" type="datetime2">
               <a:rPr lang="en-US" smtClean="0"/>
-              <a:t>Monday, April 12, 2021</a:t>
+              <a:t>Monday, April 19, 2021</a:t>
             </a:fld>
             <a:endParaRPr lang="en-US" dirty="0"/>
           </a:p>
@@ -4472,7 +4477,7 @@
           <a:p>
             <a:fld id="{EE2EBD84-71F4-4271-8C46-0D47C0A9B12E}" type="datetime2">
               <a:rPr lang="en-US" smtClean="0"/>
-              <a:t>Monday, April 12, 2021</a:t>
+              <a:t>Monday, April 19, 2021</a:t>
             </a:fld>
             <a:endParaRPr lang="en-US"/>
           </a:p>
@@ -4683,7 +4688,7 @@
           <a:p>
             <a:fld id="{ABAE0CE1-F450-4107-B2CB-17B18F8A3F4A}" type="datetime2">
               <a:rPr lang="en-US" smtClean="0"/>
-              <a:t>Monday, April 12, 2021</a:t>
+              <a:t>Monday, April 19, 2021</a:t>
             </a:fld>
             <a:endParaRPr lang="en-US"/>
           </a:p>
@@ -5348,7 +5353,7 @@
           <a:p>
             <a:fld id="{6FE8C025-CD7A-4966-867E-81CF82B15267}" type="datetime2">
               <a:rPr lang="en-US" smtClean="0"/>
-              <a:t>Monday, April 12, 2021</a:t>
+              <a:t>Monday, April 19, 2021</a:t>
             </a:fld>
             <a:endParaRPr lang="en-US"/>
           </a:p>
@@ -5968,7 +5973,7 @@
           <a:p>
             <a:fld id="{FE809929-0719-4517-94D6-FDF7F99E70F6}" type="datetime2">
               <a:rPr lang="en-US" smtClean="0"/>
-              <a:t>Monday, April 12, 2021</a:t>
+              <a:t>Monday, April 19, 2021</a:t>
             </a:fld>
             <a:endParaRPr lang="en-US"/>
           </a:p>
@@ -7086,7 +7091,7 @@
           <a:p>
             <a:fld id="{20E95673-5512-4AAA-9AEB-E00C61EC65D5}" type="datetime2">
               <a:rPr lang="en-US" smtClean="0"/>
-              <a:t>Monday, April 12, 2021</a:t>
+              <a:t>Monday, April 19, 2021</a:t>
             </a:fld>
             <a:endParaRPr lang="en-US"/>
           </a:p>
@@ -7633,7 +7638,7 @@
           <a:p>
             <a:fld id="{C13138FA-2E87-4873-8BBA-13E447C9A99A}" type="datetime2">
               <a:rPr lang="en-US" smtClean="0"/>
-              <a:t>Monday, April 12, 2021</a:t>
+              <a:t>Monday, April 19, 2021</a:t>
             </a:fld>
             <a:endParaRPr lang="en-US"/>
           </a:p>
@@ -7794,7 +7799,7 @@
           <a:p>
             <a:fld id="{D75BB40A-97BD-4BFB-B639-0BFF95FDE8B7}" type="datetime2">
               <a:rPr lang="en-US" smtClean="0"/>
-              <a:t>Monday, April 12, 2021</a:t>
+              <a:t>Monday, April 19, 2021</a:t>
             </a:fld>
             <a:endParaRPr lang="en-US"/>
           </a:p>
@@ -8829,7 +8834,7 @@
           <a:p>
             <a:fld id="{9EE9E0E3-ECF6-4CFE-8698-AEFEBCECC3C0}" type="datetime2">
               <a:rPr lang="en-US" smtClean="0"/>
-              <a:t>Monday, April 12, 2021</a:t>
+              <a:t>Monday, April 19, 2021</a:t>
             </a:fld>
             <a:endParaRPr lang="en-US"/>
           </a:p>
@@ -9475,7 +9480,7 @@
           <a:p>
             <a:fld id="{251462FC-960E-4740-921F-B36862979F21}" type="datetime2">
               <a:rPr lang="en-US" smtClean="0"/>
-              <a:t>Monday, April 12, 2021</a:t>
+              <a:t>Monday, April 19, 2021</a:t>
             </a:fld>
             <a:endParaRPr lang="en-US"/>
           </a:p>
@@ -10239,7 +10244,7 @@
           <a:p>
             <a:fld id="{E50BC9E2-CB44-4C05-9BB5-496C18A241E0}" type="datetime2">
               <a:rPr lang="en-US" smtClean="0"/>
-              <a:t>Monday, April 12, 2021</a:t>
+              <a:t>Monday, April 19, 2021</a:t>
             </a:fld>
             <a:endParaRPr lang="en-US"/>
           </a:p>
@@ -10492,7 +10497,7 @@
           <a:p>
             <a:fld id="{246CB39B-5F4C-4A7E-9BE3-AAFD45576D16}" type="datetime2">
               <a:rPr lang="en-US" smtClean="0"/>
-              <a:t>Monday, April 12, 2021</a:t>
+              <a:t>Monday, April 19, 2021</a:t>
             </a:fld>
             <a:endParaRPr lang="en-US" dirty="0"/>
           </a:p>
@@ -13249,6 +13254,13 @@
             <a:schemeClr val="tx1"/>
           </a:fontRef>
         </p:style>
+        <p:txBody>
+          <a:bodyPr/>
+          <a:lstStyle/>
+          <a:p>
+            <a:endParaRPr lang="fr-FR" dirty="0"/>
+          </a:p>
+        </p:txBody>
       </p:sp>
       <p:sp>
         <p:nvSpPr>
@@ -13310,6 +13322,13 @@
             <a:schemeClr val="tx1"/>
           </a:fontRef>
         </p:style>
+        <p:txBody>
+          <a:bodyPr/>
+          <a:lstStyle/>
+          <a:p>
+            <a:endParaRPr lang="fr-FR" dirty="0"/>
+          </a:p>
+        </p:txBody>
       </p:sp>
       <p:sp>
         <p:nvSpPr>
@@ -13422,7 +13441,7 @@
         </p:nvSpPr>
         <p:spPr>
           <a:xfrm>
-            <a:off x="3661926" y="2349650"/>
+            <a:off x="5610322" y="1388931"/>
             <a:ext cx="971355" cy="246221"/>
           </a:xfrm>
           <a:prstGeom prst="rect">
@@ -13588,1710 +13607,6 @@
       </p:sp>
       <p:sp>
         <p:nvSpPr>
-          <p:cNvPr id="22" name="Freeform 92">
-            <a:extLst>
-              <a:ext uri="{FF2B5EF4-FFF2-40B4-BE49-F238E27FC236}">
-                <a16:creationId xmlns:a16="http://schemas.microsoft.com/office/drawing/2014/main" id="{89E4BEC1-4AC0-4EBC-9F25-F30056D1D28A}"/>
-              </a:ext>
-            </a:extLst>
-          </p:cNvPr>
-          <p:cNvSpPr>
-            <a:spLocks noEditPoints="1"/>
-          </p:cNvSpPr>
-          <p:nvPr/>
-        </p:nvSpPr>
-        <p:spPr bwMode="auto">
-          <a:xfrm>
-            <a:off x="5708957" y="2663988"/>
-            <a:ext cx="774091" cy="582281"/>
-          </a:xfrm>
-          <a:custGeom>
-            <a:avLst/>
-            <a:gdLst/>
-            <a:ahLst/>
-            <a:cxnLst>
-              <a:cxn ang="0">
-                <a:pos x="101" y="2"/>
-              </a:cxn>
-              <a:cxn ang="0">
-                <a:pos x="27" y="0"/>
-              </a:cxn>
-              <a:cxn ang="0">
-                <a:pos x="2" y="22"/>
-              </a:cxn>
-              <a:cxn ang="0">
-                <a:pos x="2" y="32"/>
-              </a:cxn>
-              <a:cxn ang="0">
-                <a:pos x="61" y="92"/>
-              </a:cxn>
-              <a:cxn ang="0">
-                <a:pos x="121" y="32"/>
-              </a:cxn>
-              <a:cxn ang="0">
-                <a:pos x="120" y="22"/>
-              </a:cxn>
-              <a:cxn ang="0">
-                <a:pos x="86" y="14"/>
-              </a:cxn>
-              <a:cxn ang="0">
-                <a:pos x="93" y="8"/>
-              </a:cxn>
-              <a:cxn ang="0">
-                <a:pos x="76" y="27"/>
-              </a:cxn>
-              <a:cxn ang="0">
-                <a:pos x="93" y="27"/>
-              </a:cxn>
-              <a:cxn ang="0">
-                <a:pos x="73" y="25"/>
-              </a:cxn>
-              <a:cxn ang="0">
-                <a:pos x="75" y="9"/>
-              </a:cxn>
-              <a:cxn ang="0">
-                <a:pos x="70" y="27"/>
-              </a:cxn>
-              <a:cxn ang="0">
-                <a:pos x="61" y="20"/>
-              </a:cxn>
-              <a:cxn ang="0">
-                <a:pos x="70" y="8"/>
-              </a:cxn>
-              <a:cxn ang="0">
-                <a:pos x="53" y="8"/>
-              </a:cxn>
-              <a:cxn ang="0">
-                <a:pos x="58" y="17"/>
-              </a:cxn>
-              <a:cxn ang="0">
-                <a:pos x="40" y="16"/>
-              </a:cxn>
-              <a:cxn ang="0">
-                <a:pos x="58" y="17"/>
-              </a:cxn>
-              <a:cxn ang="0">
-                <a:pos x="30" y="27"/>
-              </a:cxn>
-              <a:cxn ang="0">
-                <a:pos x="47" y="27"/>
-              </a:cxn>
-              <a:cxn ang="0">
-                <a:pos x="37" y="14"/>
-              </a:cxn>
-              <a:cxn ang="0">
-                <a:pos x="43" y="8"/>
-              </a:cxn>
-              <a:cxn ang="0">
-                <a:pos x="34" y="17"/>
-              </a:cxn>
-              <a:cxn ang="0">
-                <a:pos x="8" y="27"/>
-              </a:cxn>
-              <a:cxn ang="0">
-                <a:pos x="11" y="31"/>
-              </a:cxn>
-              <a:cxn ang="0">
-                <a:pos x="49" y="71"/>
-              </a:cxn>
-              <a:cxn ang="0">
-                <a:pos x="29" y="31"/>
-              </a:cxn>
-              <a:cxn ang="0">
-                <a:pos x="57" y="78"/>
-              </a:cxn>
-              <a:cxn ang="0">
-                <a:pos x="52" y="31"/>
-              </a:cxn>
-              <a:cxn ang="0">
-                <a:pos x="61" y="79"/>
-              </a:cxn>
-              <a:cxn ang="0">
-                <a:pos x="65" y="78"/>
-              </a:cxn>
-              <a:cxn ang="0">
-                <a:pos x="94" y="31"/>
-              </a:cxn>
-              <a:cxn ang="0">
-                <a:pos x="74" y="71"/>
-              </a:cxn>
-              <a:cxn ang="0">
-                <a:pos x="112" y="31"/>
-              </a:cxn>
-              <a:cxn ang="0">
-                <a:pos x="99" y="27"/>
-              </a:cxn>
-              <a:cxn ang="0">
-                <a:pos x="97" y="9"/>
-              </a:cxn>
-              <a:cxn ang="0">
-                <a:pos x="99" y="27"/>
-              </a:cxn>
-              <a:cxn ang="0">
-                <a:pos x="99" y="27"/>
-              </a:cxn>
-            </a:cxnLst>
-            <a:rect l="0" t="0" r="r" b="b"/>
-            <a:pathLst>
-              <a:path w="123" h="92">
-                <a:moveTo>
-                  <a:pt x="120" y="22"/>
-                </a:moveTo>
-                <a:cubicBezTo>
-                  <a:pt x="101" y="2"/>
-                  <a:pt x="101" y="2"/>
-                  <a:pt x="101" y="2"/>
-                </a:cubicBezTo>
-                <a:cubicBezTo>
-                  <a:pt x="100" y="1"/>
-                  <a:pt x="98" y="0"/>
-                  <a:pt x="96" y="0"/>
-                </a:cubicBezTo>
-                <a:cubicBezTo>
-                  <a:pt x="27" y="0"/>
-                  <a:pt x="27" y="0"/>
-                  <a:pt x="27" y="0"/>
-                </a:cubicBezTo>
-                <a:cubicBezTo>
-                  <a:pt x="25" y="0"/>
-                  <a:pt x="23" y="1"/>
-                  <a:pt x="22" y="2"/>
-                </a:cubicBezTo>
-                <a:cubicBezTo>
-                  <a:pt x="2" y="22"/>
-                  <a:pt x="2" y="22"/>
-                  <a:pt x="2" y="22"/>
-                </a:cubicBezTo>
-                <a:cubicBezTo>
-                  <a:pt x="1" y="23"/>
-                  <a:pt x="0" y="25"/>
-                  <a:pt x="0" y="27"/>
-                </a:cubicBezTo>
-                <a:cubicBezTo>
-                  <a:pt x="0" y="29"/>
-                  <a:pt x="1" y="31"/>
-                  <a:pt x="2" y="32"/>
-                </a:cubicBezTo>
-                <a:cubicBezTo>
-                  <a:pt x="56" y="90"/>
-                  <a:pt x="56" y="90"/>
-                  <a:pt x="56" y="90"/>
-                </a:cubicBezTo>
-                <a:cubicBezTo>
-                  <a:pt x="57" y="91"/>
-                  <a:pt x="59" y="92"/>
-                  <a:pt x="61" y="92"/>
-                </a:cubicBezTo>
-                <a:cubicBezTo>
-                  <a:pt x="64" y="92"/>
-                  <a:pt x="66" y="91"/>
-                  <a:pt x="67" y="90"/>
-                </a:cubicBezTo>
-                <a:cubicBezTo>
-                  <a:pt x="121" y="32"/>
-                  <a:pt x="121" y="32"/>
-                  <a:pt x="121" y="32"/>
-                </a:cubicBezTo>
-                <a:cubicBezTo>
-                  <a:pt x="122" y="31"/>
-                  <a:pt x="123" y="29"/>
-                  <a:pt x="123" y="27"/>
-                </a:cubicBezTo>
-                <a:cubicBezTo>
-                  <a:pt x="123" y="25"/>
-                  <a:pt x="122" y="23"/>
-                  <a:pt x="120" y="22"/>
-                </a:cubicBezTo>
-                <a:close/>
-                <a:moveTo>
-                  <a:pt x="93" y="8"/>
-                </a:moveTo>
-                <a:cubicBezTo>
-                  <a:pt x="86" y="14"/>
-                  <a:pt x="86" y="14"/>
-                  <a:pt x="86" y="14"/>
-                </a:cubicBezTo>
-                <a:cubicBezTo>
-                  <a:pt x="79" y="8"/>
-                  <a:pt x="79" y="8"/>
-                  <a:pt x="79" y="8"/>
-                </a:cubicBezTo>
-                <a:lnTo>
-                  <a:pt x="93" y="8"/>
-                </a:lnTo>
-                <a:close/>
-                <a:moveTo>
-                  <a:pt x="93" y="27"/>
-                </a:moveTo>
-                <a:cubicBezTo>
-                  <a:pt x="76" y="27"/>
-                  <a:pt x="76" y="27"/>
-                  <a:pt x="76" y="27"/>
-                </a:cubicBezTo>
-                <a:cubicBezTo>
-                  <a:pt x="85" y="19"/>
-                  <a:pt x="85" y="19"/>
-                  <a:pt x="85" y="19"/>
-                </a:cubicBezTo>
-                <a:lnTo>
-                  <a:pt x="93" y="27"/>
-                </a:lnTo>
-                <a:close/>
-                <a:moveTo>
-                  <a:pt x="83" y="16"/>
-                </a:moveTo>
-                <a:cubicBezTo>
-                  <a:pt x="73" y="25"/>
-                  <a:pt x="73" y="25"/>
-                  <a:pt x="73" y="25"/>
-                </a:cubicBezTo>
-                <a:cubicBezTo>
-                  <a:pt x="64" y="17"/>
-                  <a:pt x="64" y="17"/>
-                  <a:pt x="64" y="17"/>
-                </a:cubicBezTo>
-                <a:cubicBezTo>
-                  <a:pt x="75" y="9"/>
-                  <a:pt x="75" y="9"/>
-                  <a:pt x="75" y="9"/>
-                </a:cubicBezTo>
-                <a:lnTo>
-                  <a:pt x="83" y="16"/>
-                </a:lnTo>
-                <a:close/>
-                <a:moveTo>
-                  <a:pt x="70" y="27"/>
-                </a:moveTo>
-                <a:cubicBezTo>
-                  <a:pt x="53" y="27"/>
-                  <a:pt x="53" y="27"/>
-                  <a:pt x="53" y="27"/>
-                </a:cubicBezTo>
-                <a:cubicBezTo>
-                  <a:pt x="61" y="20"/>
-                  <a:pt x="61" y="20"/>
-                  <a:pt x="61" y="20"/>
-                </a:cubicBezTo>
-                <a:lnTo>
-                  <a:pt x="70" y="27"/>
-                </a:lnTo>
-                <a:close/>
-                <a:moveTo>
-                  <a:pt x="70" y="8"/>
-                </a:moveTo>
-                <a:cubicBezTo>
-                  <a:pt x="61" y="15"/>
-                  <a:pt x="61" y="15"/>
-                  <a:pt x="61" y="15"/>
-                </a:cubicBezTo>
-                <a:cubicBezTo>
-                  <a:pt x="53" y="8"/>
-                  <a:pt x="53" y="8"/>
-                  <a:pt x="53" y="8"/>
-                </a:cubicBezTo>
-                <a:lnTo>
-                  <a:pt x="70" y="8"/>
-                </a:lnTo>
-                <a:close/>
-                <a:moveTo>
-                  <a:pt x="58" y="17"/>
-                </a:moveTo>
-                <a:cubicBezTo>
-                  <a:pt x="50" y="25"/>
-                  <a:pt x="50" y="25"/>
-                  <a:pt x="50" y="25"/>
-                </a:cubicBezTo>
-                <a:cubicBezTo>
-                  <a:pt x="40" y="16"/>
-                  <a:pt x="40" y="16"/>
-                  <a:pt x="40" y="16"/>
-                </a:cubicBezTo>
-                <a:cubicBezTo>
-                  <a:pt x="48" y="9"/>
-                  <a:pt x="48" y="9"/>
-                  <a:pt x="48" y="9"/>
-                </a:cubicBezTo>
-                <a:lnTo>
-                  <a:pt x="58" y="17"/>
-                </a:lnTo>
-                <a:close/>
-                <a:moveTo>
-                  <a:pt x="47" y="27"/>
-                </a:moveTo>
-                <a:cubicBezTo>
-                  <a:pt x="30" y="27"/>
-                  <a:pt x="30" y="27"/>
-                  <a:pt x="30" y="27"/>
-                </a:cubicBezTo>
-                <a:cubicBezTo>
-                  <a:pt x="37" y="19"/>
-                  <a:pt x="37" y="19"/>
-                  <a:pt x="37" y="19"/>
-                </a:cubicBezTo>
-                <a:lnTo>
-                  <a:pt x="47" y="27"/>
-                </a:lnTo>
-                <a:close/>
-                <a:moveTo>
-                  <a:pt x="43" y="8"/>
-                </a:moveTo>
-                <a:cubicBezTo>
-                  <a:pt x="37" y="14"/>
-                  <a:pt x="37" y="14"/>
-                  <a:pt x="37" y="14"/>
-                </a:cubicBezTo>
-                <a:cubicBezTo>
-                  <a:pt x="30" y="8"/>
-                  <a:pt x="30" y="8"/>
-                  <a:pt x="30" y="8"/>
-                </a:cubicBezTo>
-                <a:lnTo>
-                  <a:pt x="43" y="8"/>
-                </a:lnTo>
-                <a:close/>
-                <a:moveTo>
-                  <a:pt x="26" y="9"/>
-                </a:moveTo>
-                <a:cubicBezTo>
-                  <a:pt x="34" y="17"/>
-                  <a:pt x="34" y="17"/>
-                  <a:pt x="34" y="17"/>
-                </a:cubicBezTo>
-                <a:cubicBezTo>
-                  <a:pt x="24" y="27"/>
-                  <a:pt x="24" y="27"/>
-                  <a:pt x="24" y="27"/>
-                </a:cubicBezTo>
-                <a:cubicBezTo>
-                  <a:pt x="8" y="27"/>
-                  <a:pt x="8" y="27"/>
-                  <a:pt x="8" y="27"/>
-                </a:cubicBezTo>
-                <a:lnTo>
-                  <a:pt x="26" y="9"/>
-                </a:lnTo>
-                <a:close/>
-                <a:moveTo>
-                  <a:pt x="11" y="31"/>
-                </a:moveTo>
-                <a:cubicBezTo>
-                  <a:pt x="25" y="31"/>
-                  <a:pt x="25" y="31"/>
-                  <a:pt x="25" y="31"/>
-                </a:cubicBezTo>
-                <a:cubicBezTo>
-                  <a:pt x="49" y="71"/>
-                  <a:pt x="49" y="71"/>
-                  <a:pt x="49" y="71"/>
-                </a:cubicBezTo>
-                <a:lnTo>
-                  <a:pt x="11" y="31"/>
-                </a:lnTo>
-                <a:close/>
-                <a:moveTo>
-                  <a:pt x="29" y="31"/>
-                </a:moveTo>
-                <a:cubicBezTo>
-                  <a:pt x="48" y="31"/>
-                  <a:pt x="48" y="31"/>
-                  <a:pt x="48" y="31"/>
-                </a:cubicBezTo>
-                <a:cubicBezTo>
-                  <a:pt x="57" y="78"/>
-                  <a:pt x="57" y="78"/>
-                  <a:pt x="57" y="78"/>
-                </a:cubicBezTo>
-                <a:lnTo>
-                  <a:pt x="29" y="31"/>
-                </a:lnTo>
-                <a:close/>
-                <a:moveTo>
-                  <a:pt x="52" y="31"/>
-                </a:moveTo>
-                <a:cubicBezTo>
-                  <a:pt x="71" y="31"/>
-                  <a:pt x="71" y="31"/>
-                  <a:pt x="71" y="31"/>
-                </a:cubicBezTo>
-                <a:cubicBezTo>
-                  <a:pt x="61" y="79"/>
-                  <a:pt x="61" y="79"/>
-                  <a:pt x="61" y="79"/>
-                </a:cubicBezTo>
-                <a:lnTo>
-                  <a:pt x="52" y="31"/>
-                </a:lnTo>
-                <a:close/>
-                <a:moveTo>
-                  <a:pt x="65" y="78"/>
-                </a:moveTo>
-                <a:cubicBezTo>
-                  <a:pt x="75" y="31"/>
-                  <a:pt x="75" y="31"/>
-                  <a:pt x="75" y="31"/>
-                </a:cubicBezTo>
-                <a:cubicBezTo>
-                  <a:pt x="94" y="31"/>
-                  <a:pt x="94" y="31"/>
-                  <a:pt x="94" y="31"/>
-                </a:cubicBezTo>
-                <a:lnTo>
-                  <a:pt x="65" y="78"/>
-                </a:lnTo>
-                <a:close/>
-                <a:moveTo>
-                  <a:pt x="74" y="71"/>
-                </a:moveTo>
-                <a:cubicBezTo>
-                  <a:pt x="98" y="31"/>
-                  <a:pt x="98" y="31"/>
-                  <a:pt x="98" y="31"/>
-                </a:cubicBezTo>
-                <a:cubicBezTo>
-                  <a:pt x="112" y="31"/>
-                  <a:pt x="112" y="31"/>
-                  <a:pt x="112" y="31"/>
-                </a:cubicBezTo>
-                <a:lnTo>
-                  <a:pt x="74" y="71"/>
-                </a:lnTo>
-                <a:close/>
-                <a:moveTo>
-                  <a:pt x="99" y="27"/>
-                </a:moveTo>
-                <a:cubicBezTo>
-                  <a:pt x="88" y="17"/>
-                  <a:pt x="88" y="17"/>
-                  <a:pt x="88" y="17"/>
-                </a:cubicBezTo>
-                <a:cubicBezTo>
-                  <a:pt x="97" y="9"/>
-                  <a:pt x="97" y="9"/>
-                  <a:pt x="97" y="9"/>
-                </a:cubicBezTo>
-                <a:cubicBezTo>
-                  <a:pt x="115" y="27"/>
-                  <a:pt x="115" y="27"/>
-                  <a:pt x="115" y="27"/>
-                </a:cubicBezTo>
-                <a:lnTo>
-                  <a:pt x="99" y="27"/>
-                </a:lnTo>
-                <a:close/>
-                <a:moveTo>
-                  <a:pt x="99" y="27"/>
-                </a:moveTo>
-                <a:cubicBezTo>
-                  <a:pt x="99" y="27"/>
-                  <a:pt x="99" y="27"/>
-                  <a:pt x="99" y="27"/>
-                </a:cubicBezTo>
-              </a:path>
-            </a:pathLst>
-          </a:custGeom>
-          <a:solidFill>
-            <a:schemeClr val="bg1"/>
-          </a:solidFill>
-          <a:ln w="9525">
-            <a:noFill/>
-            <a:round/>
-            <a:headEnd/>
-            <a:tailEnd/>
-          </a:ln>
-        </p:spPr>
-        <p:txBody>
-          <a:bodyPr vert="horz" wrap="square" lIns="121920" tIns="60960" rIns="121920" bIns="60960" numCol="1" anchor="t" anchorCtr="0" compatLnSpc="1">
-            <a:prstTxWarp prst="textNoShape">
-              <a:avLst/>
-            </a:prstTxWarp>
-          </a:bodyPr>
-          <a:lstStyle/>
-          <a:p>
-            <a:endParaRPr lang="en-US" sz="2400" dirty="0"/>
-          </a:p>
-        </p:txBody>
-      </p:sp>
-      <p:grpSp>
-        <p:nvGrpSpPr>
-          <p:cNvPr id="23" name="Group 19">
-            <a:extLst>
-              <a:ext uri="{FF2B5EF4-FFF2-40B4-BE49-F238E27FC236}">
-                <a16:creationId xmlns:a16="http://schemas.microsoft.com/office/drawing/2014/main" id="{157FFB08-D833-480C-B219-3FEB7296A814}"/>
-              </a:ext>
-            </a:extLst>
-          </p:cNvPr>
-          <p:cNvGrpSpPr/>
-          <p:nvPr/>
-        </p:nvGrpSpPr>
-        <p:grpSpPr>
-          <a:xfrm>
-            <a:off x="4701707" y="4388413"/>
-            <a:ext cx="801492" cy="753539"/>
-            <a:chOff x="2266950" y="2713038"/>
-            <a:chExt cx="371475" cy="349250"/>
-          </a:xfrm>
-          <a:solidFill>
-            <a:schemeClr val="bg1"/>
-          </a:solidFill>
-        </p:grpSpPr>
-        <p:sp>
-          <p:nvSpPr>
-            <p:cNvPr id="24" name="Freeform 122">
-              <a:extLst>
-                <a:ext uri="{FF2B5EF4-FFF2-40B4-BE49-F238E27FC236}">
-                  <a16:creationId xmlns:a16="http://schemas.microsoft.com/office/drawing/2014/main" id="{0C71B466-80FE-4E1D-9A69-2D02C6DCC9A5}"/>
-                </a:ext>
-              </a:extLst>
-            </p:cNvPr>
-            <p:cNvSpPr>
-              <a:spLocks noEditPoints="1"/>
-            </p:cNvSpPr>
-            <p:nvPr/>
-          </p:nvSpPr>
-          <p:spPr bwMode="auto">
-            <a:xfrm>
-              <a:off x="2447925" y="2903538"/>
-              <a:ext cx="44450" cy="44450"/>
-            </a:xfrm>
-            <a:custGeom>
-              <a:avLst/>
-              <a:gdLst/>
-              <a:ahLst/>
-              <a:cxnLst>
-                <a:cxn ang="0">
-                  <a:pos x="15" y="7"/>
-                </a:cxn>
-                <a:cxn ang="0">
-                  <a:pos x="7" y="15"/>
-                </a:cxn>
-                <a:cxn ang="0">
-                  <a:pos x="0" y="7"/>
-                </a:cxn>
-                <a:cxn ang="0">
-                  <a:pos x="7" y="0"/>
-                </a:cxn>
-                <a:cxn ang="0">
-                  <a:pos x="15" y="7"/>
-                </a:cxn>
-                <a:cxn ang="0">
-                  <a:pos x="15" y="7"/>
-                </a:cxn>
-                <a:cxn ang="0">
-                  <a:pos x="15" y="7"/>
-                </a:cxn>
-              </a:cxnLst>
-              <a:rect l="0" t="0" r="r" b="b"/>
-              <a:pathLst>
-                <a:path w="15" h="15">
-                  <a:moveTo>
-                    <a:pt x="15" y="7"/>
-                  </a:moveTo>
-                  <a:cubicBezTo>
-                    <a:pt x="15" y="12"/>
-                    <a:pt x="11" y="15"/>
-                    <a:pt x="7" y="15"/>
-                  </a:cubicBezTo>
-                  <a:cubicBezTo>
-                    <a:pt x="3" y="15"/>
-                    <a:pt x="0" y="12"/>
-                    <a:pt x="0" y="7"/>
-                  </a:cubicBezTo>
-                  <a:cubicBezTo>
-                    <a:pt x="0" y="3"/>
-                    <a:pt x="3" y="0"/>
-                    <a:pt x="7" y="0"/>
-                  </a:cubicBezTo>
-                  <a:cubicBezTo>
-                    <a:pt x="11" y="0"/>
-                    <a:pt x="15" y="3"/>
-                    <a:pt x="15" y="7"/>
-                  </a:cubicBezTo>
-                  <a:close/>
-                  <a:moveTo>
-                    <a:pt x="15" y="7"/>
-                  </a:moveTo>
-                  <a:cubicBezTo>
-                    <a:pt x="15" y="7"/>
-                    <a:pt x="15" y="7"/>
-                    <a:pt x="15" y="7"/>
-                  </a:cubicBezTo>
-                </a:path>
-              </a:pathLst>
-            </a:custGeom>
-            <a:grpFill/>
-            <a:ln w="9525">
-              <a:noFill/>
-              <a:round/>
-              <a:headEnd/>
-              <a:tailEnd/>
-            </a:ln>
-          </p:spPr>
-          <p:txBody>
-            <a:bodyPr vert="horz" wrap="square" lIns="121920" tIns="60960" rIns="121920" bIns="60960" numCol="1" anchor="t" anchorCtr="0" compatLnSpc="1">
-              <a:prstTxWarp prst="textNoShape">
-                <a:avLst/>
-              </a:prstTxWarp>
-            </a:bodyPr>
-            <a:lstStyle/>
-            <a:p>
-              <a:endParaRPr lang="en-US" sz="2400" dirty="0"/>
-            </a:p>
-          </p:txBody>
-        </p:sp>
-        <p:sp>
-          <p:nvSpPr>
-            <p:cNvPr id="25" name="Freeform 123">
-              <a:extLst>
-                <a:ext uri="{FF2B5EF4-FFF2-40B4-BE49-F238E27FC236}">
-                  <a16:creationId xmlns:a16="http://schemas.microsoft.com/office/drawing/2014/main" id="{9942ED41-F47A-4FE7-9A05-ED5D30DFEB69}"/>
-                </a:ext>
-              </a:extLst>
-            </p:cNvPr>
-            <p:cNvSpPr>
-              <a:spLocks noEditPoints="1"/>
-            </p:cNvSpPr>
-            <p:nvPr/>
-          </p:nvSpPr>
-          <p:spPr bwMode="auto">
-            <a:xfrm>
-              <a:off x="2266950" y="2713038"/>
-              <a:ext cx="371475" cy="349250"/>
-            </a:xfrm>
-            <a:custGeom>
-              <a:avLst/>
-              <a:gdLst/>
-              <a:ahLst/>
-              <a:cxnLst>
-                <a:cxn ang="0">
-                  <a:pos x="111" y="46"/>
-                </a:cxn>
-                <a:cxn ang="0">
-                  <a:pos x="100" y="0"/>
-                </a:cxn>
-                <a:cxn ang="0">
-                  <a:pos x="0" y="21"/>
-                </a:cxn>
-                <a:cxn ang="0">
-                  <a:pos x="21" y="119"/>
-                </a:cxn>
-                <a:cxn ang="0">
-                  <a:pos x="111" y="97"/>
-                </a:cxn>
-                <a:cxn ang="0">
-                  <a:pos x="111" y="46"/>
-                </a:cxn>
-                <a:cxn ang="0">
-                  <a:pos x="100" y="7"/>
-                </a:cxn>
-                <a:cxn ang="0">
-                  <a:pos x="104" y="35"/>
-                </a:cxn>
-                <a:cxn ang="0">
-                  <a:pos x="100" y="15"/>
-                </a:cxn>
-                <a:cxn ang="0">
-                  <a:pos x="16" y="11"/>
-                </a:cxn>
-                <a:cxn ang="0">
-                  <a:pos x="12" y="30"/>
-                </a:cxn>
-                <a:cxn ang="0">
-                  <a:pos x="21" y="7"/>
-                </a:cxn>
-                <a:cxn ang="0">
-                  <a:pos x="16" y="19"/>
-                </a:cxn>
-                <a:cxn ang="0">
-                  <a:pos x="96" y="15"/>
-                </a:cxn>
-                <a:cxn ang="0">
-                  <a:pos x="96" y="23"/>
-                </a:cxn>
-                <a:cxn ang="0">
-                  <a:pos x="16" y="26"/>
-                </a:cxn>
-                <a:cxn ang="0">
-                  <a:pos x="96" y="23"/>
-                </a:cxn>
-                <a:cxn ang="0">
-                  <a:pos x="96" y="34"/>
-                </a:cxn>
-                <a:cxn ang="0">
-                  <a:pos x="16" y="33"/>
-                </a:cxn>
-                <a:cxn ang="0">
-                  <a:pos x="96" y="30"/>
-                </a:cxn>
-                <a:cxn ang="0">
-                  <a:pos x="90" y="111"/>
-                </a:cxn>
-                <a:cxn ang="0">
-                  <a:pos x="8" y="97"/>
-                </a:cxn>
-                <a:cxn ang="0">
-                  <a:pos x="21" y="42"/>
-                </a:cxn>
-                <a:cxn ang="0">
-                  <a:pos x="104" y="46"/>
-                </a:cxn>
-                <a:cxn ang="0">
-                  <a:pos x="69" y="53"/>
-                </a:cxn>
-                <a:cxn ang="0">
-                  <a:pos x="69" y="92"/>
-                </a:cxn>
-                <a:cxn ang="0">
-                  <a:pos x="104" y="97"/>
-                </a:cxn>
-                <a:cxn ang="0">
-                  <a:pos x="69" y="84"/>
-                </a:cxn>
-                <a:cxn ang="0">
-                  <a:pos x="69" y="61"/>
-                </a:cxn>
-                <a:cxn ang="0">
-                  <a:pos x="110" y="58"/>
-                </a:cxn>
-                <a:cxn ang="0">
-                  <a:pos x="111" y="56"/>
-                </a:cxn>
-                <a:cxn ang="0">
-                  <a:pos x="109" y="84"/>
-                </a:cxn>
-                <a:cxn ang="0">
-                  <a:pos x="109" y="84"/>
-                </a:cxn>
-              </a:cxnLst>
-              <a:rect l="0" t="0" r="r" b="b"/>
-              <a:pathLst>
-                <a:path w="127" h="119">
-                  <a:moveTo>
-                    <a:pt x="111" y="46"/>
-                  </a:moveTo>
-                  <a:cubicBezTo>
-                    <a:pt x="111" y="46"/>
-                    <a:pt x="111" y="46"/>
-                    <a:pt x="111" y="46"/>
-                  </a:cubicBezTo>
-                  <a:cubicBezTo>
-                    <a:pt x="111" y="11"/>
-                    <a:pt x="111" y="11"/>
-                    <a:pt x="111" y="11"/>
-                  </a:cubicBezTo>
-                  <a:cubicBezTo>
-                    <a:pt x="111" y="5"/>
-                    <a:pt x="106" y="0"/>
-                    <a:pt x="100" y="0"/>
-                  </a:cubicBezTo>
-                  <a:cubicBezTo>
-                    <a:pt x="21" y="0"/>
-                    <a:pt x="21" y="0"/>
-                    <a:pt x="21" y="0"/>
-                  </a:cubicBezTo>
-                  <a:cubicBezTo>
-                    <a:pt x="10" y="0"/>
-                    <a:pt x="0" y="9"/>
-                    <a:pt x="0" y="21"/>
-                  </a:cubicBezTo>
-                  <a:cubicBezTo>
-                    <a:pt x="0" y="97"/>
-                    <a:pt x="0" y="97"/>
-                    <a:pt x="0" y="97"/>
-                  </a:cubicBezTo>
-                  <a:cubicBezTo>
-                    <a:pt x="0" y="109"/>
-                    <a:pt x="10" y="119"/>
-                    <a:pt x="21" y="119"/>
-                  </a:cubicBezTo>
-                  <a:cubicBezTo>
-                    <a:pt x="90" y="119"/>
-                    <a:pt x="90" y="119"/>
-                    <a:pt x="90" y="119"/>
-                  </a:cubicBezTo>
-                  <a:cubicBezTo>
-                    <a:pt x="102" y="119"/>
-                    <a:pt x="111" y="109"/>
-                    <a:pt x="111" y="97"/>
-                  </a:cubicBezTo>
-                  <a:cubicBezTo>
-                    <a:pt x="111" y="92"/>
-                    <a:pt x="111" y="92"/>
-                    <a:pt x="111" y="92"/>
-                  </a:cubicBezTo>
-                  <a:cubicBezTo>
-                    <a:pt x="127" y="80"/>
-                    <a:pt x="127" y="57"/>
-                    <a:pt x="111" y="46"/>
-                  </a:cubicBezTo>
-                  <a:close/>
-                  <a:moveTo>
-                    <a:pt x="21" y="7"/>
-                  </a:moveTo>
-                  <a:cubicBezTo>
-                    <a:pt x="100" y="7"/>
-                    <a:pt x="100" y="7"/>
-                    <a:pt x="100" y="7"/>
-                  </a:cubicBezTo>
-                  <a:cubicBezTo>
-                    <a:pt x="102" y="7"/>
-                    <a:pt x="104" y="9"/>
-                    <a:pt x="104" y="11"/>
-                  </a:cubicBezTo>
-                  <a:cubicBezTo>
-                    <a:pt x="104" y="35"/>
-                    <a:pt x="104" y="35"/>
-                    <a:pt x="104" y="35"/>
-                  </a:cubicBezTo>
-                  <a:cubicBezTo>
-                    <a:pt x="103" y="34"/>
-                    <a:pt x="101" y="34"/>
-                    <a:pt x="100" y="34"/>
-                  </a:cubicBezTo>
-                  <a:cubicBezTo>
-                    <a:pt x="100" y="15"/>
-                    <a:pt x="100" y="15"/>
-                    <a:pt x="100" y="15"/>
-                  </a:cubicBezTo>
-                  <a:cubicBezTo>
-                    <a:pt x="100" y="13"/>
-                    <a:pt x="98" y="11"/>
-                    <a:pt x="96" y="11"/>
-                  </a:cubicBezTo>
-                  <a:cubicBezTo>
-                    <a:pt x="16" y="11"/>
-                    <a:pt x="16" y="11"/>
-                    <a:pt x="16" y="11"/>
-                  </a:cubicBezTo>
-                  <a:cubicBezTo>
-                    <a:pt x="13" y="11"/>
-                    <a:pt x="12" y="13"/>
-                    <a:pt x="12" y="15"/>
-                  </a:cubicBezTo>
-                  <a:cubicBezTo>
-                    <a:pt x="12" y="30"/>
-                    <a:pt x="12" y="30"/>
-                    <a:pt x="12" y="30"/>
-                  </a:cubicBezTo>
-                  <a:cubicBezTo>
-                    <a:pt x="9" y="28"/>
-                    <a:pt x="8" y="24"/>
-                    <a:pt x="8" y="21"/>
-                  </a:cubicBezTo>
-                  <a:cubicBezTo>
-                    <a:pt x="8" y="13"/>
-                    <a:pt x="14" y="7"/>
-                    <a:pt x="21" y="7"/>
-                  </a:cubicBezTo>
-                  <a:close/>
-                  <a:moveTo>
-                    <a:pt x="96" y="19"/>
-                  </a:moveTo>
-                  <a:cubicBezTo>
-                    <a:pt x="16" y="19"/>
-                    <a:pt x="16" y="19"/>
-                    <a:pt x="16" y="19"/>
-                  </a:cubicBezTo>
-                  <a:cubicBezTo>
-                    <a:pt x="16" y="15"/>
-                    <a:pt x="16" y="15"/>
-                    <a:pt x="16" y="15"/>
-                  </a:cubicBezTo>
-                  <a:cubicBezTo>
-                    <a:pt x="96" y="15"/>
-                    <a:pt x="96" y="15"/>
-                    <a:pt x="96" y="15"/>
-                  </a:cubicBezTo>
-                  <a:lnTo>
-                    <a:pt x="96" y="19"/>
-                  </a:lnTo>
-                  <a:close/>
-                  <a:moveTo>
-                    <a:pt x="96" y="23"/>
-                  </a:moveTo>
-                  <a:cubicBezTo>
-                    <a:pt x="96" y="26"/>
-                    <a:pt x="96" y="26"/>
-                    <a:pt x="96" y="26"/>
-                  </a:cubicBezTo>
-                  <a:cubicBezTo>
-                    <a:pt x="16" y="26"/>
-                    <a:pt x="16" y="26"/>
-                    <a:pt x="16" y="26"/>
-                  </a:cubicBezTo>
-                  <a:cubicBezTo>
-                    <a:pt x="16" y="23"/>
-                    <a:pt x="16" y="23"/>
-                    <a:pt x="16" y="23"/>
-                  </a:cubicBezTo>
-                  <a:lnTo>
-                    <a:pt x="96" y="23"/>
-                  </a:lnTo>
-                  <a:close/>
-                  <a:moveTo>
-                    <a:pt x="96" y="30"/>
-                  </a:moveTo>
-                  <a:cubicBezTo>
-                    <a:pt x="96" y="34"/>
-                    <a:pt x="96" y="34"/>
-                    <a:pt x="96" y="34"/>
-                  </a:cubicBezTo>
-                  <a:cubicBezTo>
-                    <a:pt x="21" y="34"/>
-                    <a:pt x="21" y="34"/>
-                    <a:pt x="21" y="34"/>
-                  </a:cubicBezTo>
-                  <a:cubicBezTo>
-                    <a:pt x="19" y="34"/>
-                    <a:pt x="17" y="34"/>
-                    <a:pt x="16" y="33"/>
-                  </a:cubicBezTo>
-                  <a:cubicBezTo>
-                    <a:pt x="16" y="30"/>
-                    <a:pt x="16" y="30"/>
-                    <a:pt x="16" y="30"/>
-                  </a:cubicBezTo>
-                  <a:lnTo>
-                    <a:pt x="96" y="30"/>
-                  </a:lnTo>
-                  <a:close/>
-                  <a:moveTo>
-                    <a:pt x="104" y="97"/>
-                  </a:moveTo>
-                  <a:cubicBezTo>
-                    <a:pt x="104" y="105"/>
-                    <a:pt x="98" y="111"/>
-                    <a:pt x="90" y="111"/>
-                  </a:cubicBezTo>
-                  <a:cubicBezTo>
-                    <a:pt x="21" y="111"/>
-                    <a:pt x="21" y="111"/>
-                    <a:pt x="21" y="111"/>
-                  </a:cubicBezTo>
-                  <a:cubicBezTo>
-                    <a:pt x="14" y="111"/>
-                    <a:pt x="8" y="105"/>
-                    <a:pt x="8" y="97"/>
-                  </a:cubicBezTo>
-                  <a:cubicBezTo>
-                    <a:pt x="8" y="37"/>
-                    <a:pt x="8" y="37"/>
-                    <a:pt x="8" y="37"/>
-                  </a:cubicBezTo>
-                  <a:cubicBezTo>
-                    <a:pt x="11" y="40"/>
-                    <a:pt x="16" y="42"/>
-                    <a:pt x="21" y="42"/>
-                  </a:cubicBezTo>
-                  <a:cubicBezTo>
-                    <a:pt x="100" y="42"/>
-                    <a:pt x="100" y="42"/>
-                    <a:pt x="100" y="42"/>
-                  </a:cubicBezTo>
-                  <a:cubicBezTo>
-                    <a:pt x="102" y="42"/>
-                    <a:pt x="104" y="44"/>
-                    <a:pt x="104" y="46"/>
-                  </a:cubicBezTo>
-                  <a:cubicBezTo>
-                    <a:pt x="104" y="53"/>
-                    <a:pt x="104" y="53"/>
-                    <a:pt x="104" y="53"/>
-                  </a:cubicBezTo>
-                  <a:cubicBezTo>
-                    <a:pt x="69" y="53"/>
-                    <a:pt x="69" y="53"/>
-                    <a:pt x="69" y="53"/>
-                  </a:cubicBezTo>
-                  <a:cubicBezTo>
-                    <a:pt x="59" y="53"/>
-                    <a:pt x="50" y="62"/>
-                    <a:pt x="50" y="72"/>
-                  </a:cubicBezTo>
-                  <a:cubicBezTo>
-                    <a:pt x="50" y="83"/>
-                    <a:pt x="59" y="92"/>
-                    <a:pt x="69" y="92"/>
-                  </a:cubicBezTo>
-                  <a:cubicBezTo>
-                    <a:pt x="104" y="92"/>
-                    <a:pt x="104" y="92"/>
-                    <a:pt x="104" y="92"/>
-                  </a:cubicBezTo>
-                  <a:lnTo>
-                    <a:pt x="104" y="97"/>
-                  </a:lnTo>
-                  <a:close/>
-                  <a:moveTo>
-                    <a:pt x="109" y="84"/>
-                  </a:moveTo>
-                  <a:cubicBezTo>
-                    <a:pt x="69" y="84"/>
-                    <a:pt x="69" y="84"/>
-                    <a:pt x="69" y="84"/>
-                  </a:cubicBezTo>
-                  <a:cubicBezTo>
-                    <a:pt x="63" y="84"/>
-                    <a:pt x="58" y="79"/>
-                    <a:pt x="58" y="72"/>
-                  </a:cubicBezTo>
-                  <a:cubicBezTo>
-                    <a:pt x="58" y="66"/>
-                    <a:pt x="63" y="61"/>
-                    <a:pt x="69" y="61"/>
-                  </a:cubicBezTo>
-                  <a:cubicBezTo>
-                    <a:pt x="104" y="61"/>
-                    <a:pt x="104" y="61"/>
-                    <a:pt x="104" y="61"/>
-                  </a:cubicBezTo>
-                  <a:cubicBezTo>
-                    <a:pt x="106" y="61"/>
-                    <a:pt x="108" y="60"/>
-                    <a:pt x="110" y="58"/>
-                  </a:cubicBezTo>
-                  <a:cubicBezTo>
-                    <a:pt x="110" y="57"/>
-                    <a:pt x="111" y="57"/>
-                    <a:pt x="111" y="56"/>
-                  </a:cubicBezTo>
-                  <a:cubicBezTo>
-                    <a:pt x="111" y="56"/>
-                    <a:pt x="111" y="56"/>
-                    <a:pt x="111" y="56"/>
-                  </a:cubicBezTo>
-                  <a:cubicBezTo>
-                    <a:pt x="114" y="59"/>
-                    <a:pt x="115" y="64"/>
-                    <a:pt x="115" y="69"/>
-                  </a:cubicBezTo>
-                  <a:cubicBezTo>
-                    <a:pt x="115" y="75"/>
-                    <a:pt x="113" y="80"/>
-                    <a:pt x="109" y="84"/>
-                  </a:cubicBezTo>
-                  <a:close/>
-                  <a:moveTo>
-                    <a:pt x="109" y="84"/>
-                  </a:moveTo>
-                  <a:cubicBezTo>
-                    <a:pt x="109" y="84"/>
-                    <a:pt x="109" y="84"/>
-                    <a:pt x="109" y="84"/>
-                  </a:cubicBezTo>
-                </a:path>
-              </a:pathLst>
-            </a:custGeom>
-            <a:grpFill/>
-            <a:ln w="9525">
-              <a:noFill/>
-              <a:round/>
-              <a:headEnd/>
-              <a:tailEnd/>
-            </a:ln>
-          </p:spPr>
-          <p:txBody>
-            <a:bodyPr vert="horz" wrap="square" lIns="121920" tIns="60960" rIns="121920" bIns="60960" numCol="1" anchor="t" anchorCtr="0" compatLnSpc="1">
-              <a:prstTxWarp prst="textNoShape">
-                <a:avLst/>
-              </a:prstTxWarp>
-            </a:bodyPr>
-            <a:lstStyle/>
-            <a:p>
-              <a:endParaRPr lang="en-US" sz="2400" dirty="0"/>
-            </a:p>
-          </p:txBody>
-        </p:sp>
-      </p:grpSp>
-      <p:grpSp>
-        <p:nvGrpSpPr>
-          <p:cNvPr id="26" name="Group 22">
-            <a:extLst>
-              <a:ext uri="{FF2B5EF4-FFF2-40B4-BE49-F238E27FC236}">
-                <a16:creationId xmlns:a16="http://schemas.microsoft.com/office/drawing/2014/main" id="{847949F6-E6A8-435D-8ED9-BA5A2EF5268F}"/>
-              </a:ext>
-            </a:extLst>
-          </p:cNvPr>
-          <p:cNvGrpSpPr/>
-          <p:nvPr/>
-        </p:nvGrpSpPr>
-        <p:grpSpPr>
-          <a:xfrm>
-            <a:off x="6758625" y="4404811"/>
-            <a:ext cx="774092" cy="650784"/>
-            <a:chOff x="4856163" y="2736851"/>
-            <a:chExt cx="358775" cy="301625"/>
-          </a:xfrm>
-          <a:solidFill>
-            <a:schemeClr val="bg1"/>
-          </a:solidFill>
-        </p:grpSpPr>
-        <p:sp>
-          <p:nvSpPr>
-            <p:cNvPr id="27" name="Freeform 128">
-              <a:extLst>
-                <a:ext uri="{FF2B5EF4-FFF2-40B4-BE49-F238E27FC236}">
-                  <a16:creationId xmlns:a16="http://schemas.microsoft.com/office/drawing/2014/main" id="{395B0208-247D-40F6-9CEB-EFE700EFF4B1}"/>
-                </a:ext>
-              </a:extLst>
-            </p:cNvPr>
-            <p:cNvSpPr>
-              <a:spLocks noEditPoints="1"/>
-            </p:cNvSpPr>
-            <p:nvPr/>
-          </p:nvSpPr>
-          <p:spPr bwMode="auto">
-            <a:xfrm>
-              <a:off x="4946650" y="2814638"/>
-              <a:ext cx="177800" cy="179388"/>
-            </a:xfrm>
-            <a:custGeom>
-              <a:avLst/>
-              <a:gdLst/>
-              <a:ahLst/>
-              <a:cxnLst>
-                <a:cxn ang="0">
-                  <a:pos x="31" y="0"/>
-                </a:cxn>
-                <a:cxn ang="0">
-                  <a:pos x="0" y="30"/>
-                </a:cxn>
-                <a:cxn ang="0">
-                  <a:pos x="31" y="61"/>
-                </a:cxn>
-                <a:cxn ang="0">
-                  <a:pos x="61" y="30"/>
-                </a:cxn>
-                <a:cxn ang="0">
-                  <a:pos x="31" y="0"/>
-                </a:cxn>
-                <a:cxn ang="0">
-                  <a:pos x="48" y="45"/>
-                </a:cxn>
-                <a:cxn ang="0">
-                  <a:pos x="16" y="48"/>
-                </a:cxn>
-                <a:cxn ang="0">
-                  <a:pos x="13" y="15"/>
-                </a:cxn>
-                <a:cxn ang="0">
-                  <a:pos x="46" y="13"/>
-                </a:cxn>
-                <a:cxn ang="0">
-                  <a:pos x="48" y="45"/>
-                </a:cxn>
-                <a:cxn ang="0">
-                  <a:pos x="48" y="45"/>
-                </a:cxn>
-                <a:cxn ang="0">
-                  <a:pos x="48" y="45"/>
-                </a:cxn>
-              </a:cxnLst>
-              <a:rect l="0" t="0" r="r" b="b"/>
-              <a:pathLst>
-                <a:path w="61" h="61">
-                  <a:moveTo>
-                    <a:pt x="31" y="0"/>
-                  </a:moveTo>
-                  <a:cubicBezTo>
-                    <a:pt x="14" y="0"/>
-                    <a:pt x="0" y="13"/>
-                    <a:pt x="0" y="30"/>
-                  </a:cubicBezTo>
-                  <a:cubicBezTo>
-                    <a:pt x="0" y="47"/>
-                    <a:pt x="14" y="61"/>
-                    <a:pt x="31" y="61"/>
-                  </a:cubicBezTo>
-                  <a:cubicBezTo>
-                    <a:pt x="48" y="61"/>
-                    <a:pt x="61" y="47"/>
-                    <a:pt x="61" y="30"/>
-                  </a:cubicBezTo>
-                  <a:cubicBezTo>
-                    <a:pt x="61" y="13"/>
-                    <a:pt x="48" y="0"/>
-                    <a:pt x="31" y="0"/>
-                  </a:cubicBezTo>
-                  <a:close/>
-                  <a:moveTo>
-                    <a:pt x="48" y="45"/>
-                  </a:moveTo>
-                  <a:cubicBezTo>
-                    <a:pt x="40" y="55"/>
-                    <a:pt x="25" y="56"/>
-                    <a:pt x="16" y="48"/>
-                  </a:cubicBezTo>
-                  <a:cubicBezTo>
-                    <a:pt x="6" y="39"/>
-                    <a:pt x="5" y="25"/>
-                    <a:pt x="13" y="15"/>
-                  </a:cubicBezTo>
-                  <a:cubicBezTo>
-                    <a:pt x="22" y="6"/>
-                    <a:pt x="36" y="5"/>
-                    <a:pt x="46" y="13"/>
-                  </a:cubicBezTo>
-                  <a:cubicBezTo>
-                    <a:pt x="55" y="21"/>
-                    <a:pt x="57" y="36"/>
-                    <a:pt x="48" y="45"/>
-                  </a:cubicBezTo>
-                  <a:close/>
-                  <a:moveTo>
-                    <a:pt x="48" y="45"/>
-                  </a:moveTo>
-                  <a:cubicBezTo>
-                    <a:pt x="48" y="45"/>
-                    <a:pt x="48" y="45"/>
-                    <a:pt x="48" y="45"/>
-                  </a:cubicBezTo>
-                </a:path>
-              </a:pathLst>
-            </a:custGeom>
-            <a:grpFill/>
-            <a:ln w="9525">
-              <a:noFill/>
-              <a:round/>
-              <a:headEnd/>
-              <a:tailEnd/>
-            </a:ln>
-          </p:spPr>
-          <p:txBody>
-            <a:bodyPr vert="horz" wrap="square" lIns="121920" tIns="60960" rIns="121920" bIns="60960" numCol="1" anchor="t" anchorCtr="0" compatLnSpc="1">
-              <a:prstTxWarp prst="textNoShape">
-                <a:avLst/>
-              </a:prstTxWarp>
-            </a:bodyPr>
-            <a:lstStyle/>
-            <a:p>
-              <a:endParaRPr lang="en-US" sz="2400" dirty="0"/>
-            </a:p>
-          </p:txBody>
-        </p:sp>
-        <p:sp>
-          <p:nvSpPr>
-            <p:cNvPr id="28" name="Freeform 129">
-              <a:extLst>
-                <a:ext uri="{FF2B5EF4-FFF2-40B4-BE49-F238E27FC236}">
-                  <a16:creationId xmlns:a16="http://schemas.microsoft.com/office/drawing/2014/main" id="{FB49FB79-828C-4EAE-A6DD-6224986B806E}"/>
-                </a:ext>
-              </a:extLst>
-            </p:cNvPr>
-            <p:cNvSpPr>
-              <a:spLocks noEditPoints="1"/>
-            </p:cNvSpPr>
-            <p:nvPr/>
-          </p:nvSpPr>
-          <p:spPr bwMode="auto">
-            <a:xfrm>
-              <a:off x="4989513" y="2859088"/>
-              <a:ext cx="53975" cy="50800"/>
-            </a:xfrm>
-            <a:custGeom>
-              <a:avLst/>
-              <a:gdLst/>
-              <a:ahLst/>
-              <a:cxnLst>
-                <a:cxn ang="0">
-                  <a:pos x="16" y="0"/>
-                </a:cxn>
-                <a:cxn ang="0">
-                  <a:pos x="0" y="15"/>
-                </a:cxn>
-                <a:cxn ang="0">
-                  <a:pos x="2" y="17"/>
-                </a:cxn>
-                <a:cxn ang="0">
-                  <a:pos x="4" y="15"/>
-                </a:cxn>
-                <a:cxn ang="0">
-                  <a:pos x="16" y="4"/>
-                </a:cxn>
-                <a:cxn ang="0">
-                  <a:pos x="18" y="2"/>
-                </a:cxn>
-                <a:cxn ang="0">
-                  <a:pos x="16" y="0"/>
-                </a:cxn>
-                <a:cxn ang="0">
-                  <a:pos x="16" y="0"/>
-                </a:cxn>
-                <a:cxn ang="0">
-                  <a:pos x="16" y="0"/>
-                </a:cxn>
-              </a:cxnLst>
-              <a:rect l="0" t="0" r="r" b="b"/>
-              <a:pathLst>
-                <a:path w="18" h="17">
-                  <a:moveTo>
-                    <a:pt x="16" y="0"/>
-                  </a:moveTo>
-                  <a:cubicBezTo>
-                    <a:pt x="7" y="0"/>
-                    <a:pt x="0" y="7"/>
-                    <a:pt x="0" y="15"/>
-                  </a:cubicBezTo>
-                  <a:cubicBezTo>
-                    <a:pt x="0" y="16"/>
-                    <a:pt x="1" y="17"/>
-                    <a:pt x="2" y="17"/>
-                  </a:cubicBezTo>
-                  <a:cubicBezTo>
-                    <a:pt x="3" y="17"/>
-                    <a:pt x="4" y="16"/>
-                    <a:pt x="4" y="15"/>
-                  </a:cubicBezTo>
-                  <a:cubicBezTo>
-                    <a:pt x="4" y="9"/>
-                    <a:pt x="9" y="4"/>
-                    <a:pt x="16" y="4"/>
-                  </a:cubicBezTo>
-                  <a:cubicBezTo>
-                    <a:pt x="17" y="4"/>
-                    <a:pt x="18" y="3"/>
-                    <a:pt x="18" y="2"/>
-                  </a:cubicBezTo>
-                  <a:cubicBezTo>
-                    <a:pt x="18" y="1"/>
-                    <a:pt x="17" y="0"/>
-                    <a:pt x="16" y="0"/>
-                  </a:cubicBezTo>
-                  <a:close/>
-                  <a:moveTo>
-                    <a:pt x="16" y="0"/>
-                  </a:moveTo>
-                  <a:cubicBezTo>
-                    <a:pt x="16" y="0"/>
-                    <a:pt x="16" y="0"/>
-                    <a:pt x="16" y="0"/>
-                  </a:cubicBezTo>
-                </a:path>
-              </a:pathLst>
-            </a:custGeom>
-            <a:grpFill/>
-            <a:ln w="9525">
-              <a:noFill/>
-              <a:round/>
-              <a:headEnd/>
-              <a:tailEnd/>
-            </a:ln>
-          </p:spPr>
-          <p:txBody>
-            <a:bodyPr vert="horz" wrap="square" lIns="121920" tIns="60960" rIns="121920" bIns="60960" numCol="1" anchor="t" anchorCtr="0" compatLnSpc="1">
-              <a:prstTxWarp prst="textNoShape">
-                <a:avLst/>
-              </a:prstTxWarp>
-            </a:bodyPr>
-            <a:lstStyle/>
-            <a:p>
-              <a:endParaRPr lang="en-US" sz="2400" dirty="0"/>
-            </a:p>
-          </p:txBody>
-        </p:sp>
-        <p:sp>
-          <p:nvSpPr>
-            <p:cNvPr id="29" name="Freeform 130">
-              <a:extLst>
-                <a:ext uri="{FF2B5EF4-FFF2-40B4-BE49-F238E27FC236}">
-                  <a16:creationId xmlns:a16="http://schemas.microsoft.com/office/drawing/2014/main" id="{E546764B-5756-40D9-AD9B-00CA0063489D}"/>
-                </a:ext>
-              </a:extLst>
-            </p:cNvPr>
-            <p:cNvSpPr>
-              <a:spLocks noEditPoints="1"/>
-            </p:cNvSpPr>
-            <p:nvPr/>
-          </p:nvSpPr>
-          <p:spPr bwMode="auto">
-            <a:xfrm>
-              <a:off x="4856163" y="2736851"/>
-              <a:ext cx="358775" cy="301625"/>
-            </a:xfrm>
-            <a:custGeom>
-              <a:avLst/>
-              <a:gdLst/>
-              <a:ahLst/>
-              <a:cxnLst>
-                <a:cxn ang="0">
-                  <a:pos x="114" y="23"/>
-                </a:cxn>
-                <a:cxn ang="0">
-                  <a:pos x="97" y="20"/>
-                </a:cxn>
-                <a:cxn ang="0">
-                  <a:pos x="92" y="7"/>
-                </a:cxn>
-                <a:cxn ang="0">
-                  <a:pos x="81" y="0"/>
-                </a:cxn>
-                <a:cxn ang="0">
-                  <a:pos x="43" y="0"/>
-                </a:cxn>
-                <a:cxn ang="0">
-                  <a:pos x="32" y="7"/>
-                </a:cxn>
-                <a:cxn ang="0">
-                  <a:pos x="27" y="20"/>
-                </a:cxn>
-                <a:cxn ang="0">
-                  <a:pos x="10" y="23"/>
-                </a:cxn>
-                <a:cxn ang="0">
-                  <a:pos x="0" y="34"/>
-                </a:cxn>
-                <a:cxn ang="0">
-                  <a:pos x="0" y="92"/>
-                </a:cxn>
-                <a:cxn ang="0">
-                  <a:pos x="12" y="103"/>
-                </a:cxn>
-                <a:cxn ang="0">
-                  <a:pos x="112" y="103"/>
-                </a:cxn>
-                <a:cxn ang="0">
-                  <a:pos x="123" y="92"/>
-                </a:cxn>
-                <a:cxn ang="0">
-                  <a:pos x="123" y="34"/>
-                </a:cxn>
-                <a:cxn ang="0">
-                  <a:pos x="114" y="23"/>
-                </a:cxn>
-                <a:cxn ang="0">
-                  <a:pos x="115" y="92"/>
-                </a:cxn>
-                <a:cxn ang="0">
-                  <a:pos x="112" y="96"/>
-                </a:cxn>
-                <a:cxn ang="0">
-                  <a:pos x="12" y="96"/>
-                </a:cxn>
-                <a:cxn ang="0">
-                  <a:pos x="8" y="92"/>
-                </a:cxn>
-                <a:cxn ang="0">
-                  <a:pos x="8" y="34"/>
-                </a:cxn>
-                <a:cxn ang="0">
-                  <a:pos x="11" y="30"/>
-                </a:cxn>
-                <a:cxn ang="0">
-                  <a:pos x="32" y="27"/>
-                </a:cxn>
-                <a:cxn ang="0">
-                  <a:pos x="39" y="10"/>
-                </a:cxn>
-                <a:cxn ang="0">
-                  <a:pos x="43" y="7"/>
-                </a:cxn>
-                <a:cxn ang="0">
-                  <a:pos x="81" y="7"/>
-                </a:cxn>
-                <a:cxn ang="0">
-                  <a:pos x="85" y="10"/>
-                </a:cxn>
-                <a:cxn ang="0">
-                  <a:pos x="91" y="27"/>
-                </a:cxn>
-                <a:cxn ang="0">
-                  <a:pos x="112" y="30"/>
-                </a:cxn>
-                <a:cxn ang="0">
-                  <a:pos x="115" y="34"/>
-                </a:cxn>
-                <a:cxn ang="0">
-                  <a:pos x="115" y="92"/>
-                </a:cxn>
-                <a:cxn ang="0">
-                  <a:pos x="115" y="92"/>
-                </a:cxn>
-                <a:cxn ang="0">
-                  <a:pos x="115" y="92"/>
-                </a:cxn>
-              </a:cxnLst>
-              <a:rect l="0" t="0" r="r" b="b"/>
-              <a:pathLst>
-                <a:path w="123" h="103">
-                  <a:moveTo>
-                    <a:pt x="114" y="23"/>
-                  </a:moveTo>
-                  <a:cubicBezTo>
-                    <a:pt x="97" y="20"/>
-                    <a:pt x="97" y="20"/>
-                    <a:pt x="97" y="20"/>
-                  </a:cubicBezTo>
-                  <a:cubicBezTo>
-                    <a:pt x="92" y="7"/>
-                    <a:pt x="92" y="7"/>
-                    <a:pt x="92" y="7"/>
-                  </a:cubicBezTo>
-                  <a:cubicBezTo>
-                    <a:pt x="90" y="3"/>
-                    <a:pt x="86" y="0"/>
-                    <a:pt x="81" y="0"/>
-                  </a:cubicBezTo>
-                  <a:cubicBezTo>
-                    <a:pt x="43" y="0"/>
-                    <a:pt x="43" y="0"/>
-                    <a:pt x="43" y="0"/>
-                  </a:cubicBezTo>
-                  <a:cubicBezTo>
-                    <a:pt x="38" y="0"/>
-                    <a:pt x="34" y="3"/>
-                    <a:pt x="32" y="7"/>
-                  </a:cubicBezTo>
-                  <a:cubicBezTo>
-                    <a:pt x="27" y="20"/>
-                    <a:pt x="27" y="20"/>
-                    <a:pt x="27" y="20"/>
-                  </a:cubicBezTo>
-                  <a:cubicBezTo>
-                    <a:pt x="10" y="23"/>
-                    <a:pt x="10" y="23"/>
-                    <a:pt x="10" y="23"/>
-                  </a:cubicBezTo>
-                  <a:cubicBezTo>
-                    <a:pt x="4" y="24"/>
-                    <a:pt x="0" y="29"/>
-                    <a:pt x="0" y="34"/>
-                  </a:cubicBezTo>
-                  <a:cubicBezTo>
-                    <a:pt x="0" y="92"/>
-                    <a:pt x="0" y="92"/>
-                    <a:pt x="0" y="92"/>
-                  </a:cubicBezTo>
-                  <a:cubicBezTo>
-                    <a:pt x="0" y="98"/>
-                    <a:pt x="6" y="103"/>
-                    <a:pt x="12" y="103"/>
-                  </a:cubicBezTo>
-                  <a:cubicBezTo>
-                    <a:pt x="112" y="103"/>
-                    <a:pt x="112" y="103"/>
-                    <a:pt x="112" y="103"/>
-                  </a:cubicBezTo>
-                  <a:cubicBezTo>
-                    <a:pt x="118" y="103"/>
-                    <a:pt x="123" y="98"/>
-                    <a:pt x="123" y="92"/>
-                  </a:cubicBezTo>
-                  <a:cubicBezTo>
-                    <a:pt x="123" y="34"/>
-                    <a:pt x="123" y="34"/>
-                    <a:pt x="123" y="34"/>
-                  </a:cubicBezTo>
-                  <a:cubicBezTo>
-                    <a:pt x="123" y="29"/>
-                    <a:pt x="119" y="24"/>
-                    <a:pt x="114" y="23"/>
-                  </a:cubicBezTo>
-                  <a:close/>
-                  <a:moveTo>
-                    <a:pt x="115" y="92"/>
-                  </a:moveTo>
-                  <a:cubicBezTo>
-                    <a:pt x="115" y="94"/>
-                    <a:pt x="114" y="96"/>
-                    <a:pt x="112" y="96"/>
-                  </a:cubicBezTo>
-                  <a:cubicBezTo>
-                    <a:pt x="12" y="96"/>
-                    <a:pt x="12" y="96"/>
-                    <a:pt x="12" y="96"/>
-                  </a:cubicBezTo>
-                  <a:cubicBezTo>
-                    <a:pt x="10" y="96"/>
-                    <a:pt x="8" y="94"/>
-                    <a:pt x="8" y="92"/>
-                  </a:cubicBezTo>
-                  <a:cubicBezTo>
-                    <a:pt x="8" y="34"/>
-                    <a:pt x="8" y="34"/>
-                    <a:pt x="8" y="34"/>
-                  </a:cubicBezTo>
-                  <a:cubicBezTo>
-                    <a:pt x="8" y="32"/>
-                    <a:pt x="9" y="31"/>
-                    <a:pt x="11" y="30"/>
-                  </a:cubicBezTo>
-                  <a:cubicBezTo>
-                    <a:pt x="32" y="27"/>
-                    <a:pt x="32" y="27"/>
-                    <a:pt x="32" y="27"/>
-                  </a:cubicBezTo>
-                  <a:cubicBezTo>
-                    <a:pt x="39" y="10"/>
-                    <a:pt x="39" y="10"/>
-                    <a:pt x="39" y="10"/>
-                  </a:cubicBezTo>
-                  <a:cubicBezTo>
-                    <a:pt x="40" y="8"/>
-                    <a:pt x="41" y="7"/>
-                    <a:pt x="43" y="7"/>
-                  </a:cubicBezTo>
-                  <a:cubicBezTo>
-                    <a:pt x="81" y="7"/>
-                    <a:pt x="81" y="7"/>
-                    <a:pt x="81" y="7"/>
-                  </a:cubicBezTo>
-                  <a:cubicBezTo>
-                    <a:pt x="83" y="7"/>
-                    <a:pt x="84" y="8"/>
-                    <a:pt x="85" y="10"/>
-                  </a:cubicBezTo>
-                  <a:cubicBezTo>
-                    <a:pt x="91" y="27"/>
-                    <a:pt x="91" y="27"/>
-                    <a:pt x="91" y="27"/>
-                  </a:cubicBezTo>
-                  <a:cubicBezTo>
-                    <a:pt x="112" y="30"/>
-                    <a:pt x="112" y="30"/>
-                    <a:pt x="112" y="30"/>
-                  </a:cubicBezTo>
-                  <a:cubicBezTo>
-                    <a:pt x="114" y="31"/>
-                    <a:pt x="115" y="32"/>
-                    <a:pt x="115" y="34"/>
-                  </a:cubicBezTo>
-                  <a:lnTo>
-                    <a:pt x="115" y="92"/>
-                  </a:lnTo>
-                  <a:close/>
-                  <a:moveTo>
-                    <a:pt x="115" y="92"/>
-                  </a:moveTo>
-                  <a:cubicBezTo>
-                    <a:pt x="115" y="92"/>
-                    <a:pt x="115" y="92"/>
-                    <a:pt x="115" y="92"/>
-                  </a:cubicBezTo>
-                </a:path>
-              </a:pathLst>
-            </a:custGeom>
-            <a:grpFill/>
-            <a:ln w="9525">
-              <a:noFill/>
-              <a:round/>
-              <a:headEnd/>
-              <a:tailEnd/>
-            </a:ln>
-          </p:spPr>
-          <p:txBody>
-            <a:bodyPr vert="horz" wrap="square" lIns="121920" tIns="60960" rIns="121920" bIns="60960" numCol="1" anchor="t" anchorCtr="0" compatLnSpc="1">
-              <a:prstTxWarp prst="textNoShape">
-                <a:avLst/>
-              </a:prstTxWarp>
-            </a:bodyPr>
-            <a:lstStyle/>
-            <a:p>
-              <a:endParaRPr lang="en-US" sz="2400" dirty="0"/>
-            </a:p>
-          </p:txBody>
-        </p:sp>
-      </p:grpSp>
-      <p:sp>
-        <p:nvSpPr>
           <p:cNvPr id="30" name="Left-Right Arrow 26">
             <a:extLst>
               <a:ext uri="{FF2B5EF4-FFF2-40B4-BE49-F238E27FC236}">
@@ -15455,6 +13770,114 @@
           </a:p>
         </p:txBody>
       </p:sp>
+      <p:pic>
+        <p:nvPicPr>
+          <p:cNvPr id="3" name="Picture 2" descr="A white logo with a black background&#10;&#10;Description automatically generated with low confidence">
+            <a:extLst>
+              <a:ext uri="{FF2B5EF4-FFF2-40B4-BE49-F238E27FC236}">
+                <a16:creationId xmlns:a16="http://schemas.microsoft.com/office/drawing/2014/main" id="{8650C7B7-79F6-4B04-A820-4F8050880B5A}"/>
+              </a:ext>
+            </a:extLst>
+          </p:cNvPr>
+          <p:cNvPicPr>
+            <a:picLocks noChangeAspect="1"/>
+          </p:cNvPicPr>
+          <p:nvPr/>
+        </p:nvPicPr>
+        <p:blipFill>
+          <a:blip r:embed="rId2">
+            <a:extLst>
+              <a:ext uri="{28A0092B-C50C-407E-A947-70E740481C1C}">
+                <a14:useLocalDpi xmlns:a14="http://schemas.microsoft.com/office/drawing/2010/main" val="0"/>
+              </a:ext>
+            </a:extLst>
+          </a:blip>
+          <a:stretch>
+            <a:fillRect/>
+          </a:stretch>
+        </p:blipFill>
+        <p:spPr>
+          <a:xfrm>
+            <a:off x="5477430" y="2278769"/>
+            <a:ext cx="1252232" cy="1252232"/>
+          </a:xfrm>
+          <a:prstGeom prst="rect">
+            <a:avLst/>
+          </a:prstGeom>
+        </p:spPr>
+      </p:pic>
+      <p:pic>
+        <p:nvPicPr>
+          <p:cNvPr id="7" name="Picture 6" descr="Icon&#10;&#10;Description automatically generated">
+            <a:extLst>
+              <a:ext uri="{FF2B5EF4-FFF2-40B4-BE49-F238E27FC236}">
+                <a16:creationId xmlns:a16="http://schemas.microsoft.com/office/drawing/2014/main" id="{46ECA4D7-E397-44CD-AD6D-BFCD0DDBD01D}"/>
+              </a:ext>
+            </a:extLst>
+          </p:cNvPr>
+          <p:cNvPicPr>
+            <a:picLocks noChangeAspect="1"/>
+          </p:cNvPicPr>
+          <p:nvPr/>
+        </p:nvPicPr>
+        <p:blipFill>
+          <a:blip r:embed="rId3">
+            <a:extLst>
+              <a:ext uri="{28A0092B-C50C-407E-A947-70E740481C1C}">
+                <a14:useLocalDpi xmlns:a14="http://schemas.microsoft.com/office/drawing/2010/main" val="0"/>
+              </a:ext>
+            </a:extLst>
+          </a:blip>
+          <a:stretch>
+            <a:fillRect/>
+          </a:stretch>
+        </p:blipFill>
+        <p:spPr>
+          <a:xfrm>
+            <a:off x="4252754" y="4148985"/>
+            <a:ext cx="1636674" cy="1155901"/>
+          </a:xfrm>
+          <a:prstGeom prst="rect">
+            <a:avLst/>
+          </a:prstGeom>
+        </p:spPr>
+      </p:pic>
+      <p:pic>
+        <p:nvPicPr>
+          <p:cNvPr id="9" name="Picture 8" descr="Logo&#10;&#10;Description automatically generated">
+            <a:extLst>
+              <a:ext uri="{FF2B5EF4-FFF2-40B4-BE49-F238E27FC236}">
+                <a16:creationId xmlns:a16="http://schemas.microsoft.com/office/drawing/2014/main" id="{FDA3EE7F-1B9E-4A84-B457-003324634A0A}"/>
+              </a:ext>
+            </a:extLst>
+          </p:cNvPr>
+          <p:cNvPicPr>
+            <a:picLocks noChangeAspect="1"/>
+          </p:cNvPicPr>
+          <p:nvPr/>
+        </p:nvPicPr>
+        <p:blipFill>
+          <a:blip r:embed="rId4">
+            <a:extLst>
+              <a:ext uri="{28A0092B-C50C-407E-A947-70E740481C1C}">
+                <a14:useLocalDpi xmlns:a14="http://schemas.microsoft.com/office/drawing/2010/main" val="0"/>
+              </a:ext>
+            </a:extLst>
+          </a:blip>
+          <a:stretch>
+            <a:fillRect/>
+          </a:stretch>
+        </p:blipFill>
+        <p:spPr>
+          <a:xfrm>
+            <a:off x="6477836" y="4161648"/>
+            <a:ext cx="1350260" cy="1012695"/>
+          </a:xfrm>
+          <a:prstGeom prst="rect">
+            <a:avLst/>
+          </a:prstGeom>
+        </p:spPr>
+      </p:pic>
     </p:spTree>
     <p:extLst>
       <p:ext uri="{BB962C8B-B14F-4D97-AF65-F5344CB8AC3E}">
@@ -15884,276 +14307,6 @@
                             </p:childTnLst>
                           </p:cTn>
                         </p:par>
-                        <p:par>
-                          <p:cTn id="34" fill="hold">
-                            <p:stCondLst>
-                              <p:cond delay="3000"/>
-                            </p:stCondLst>
-                            <p:childTnLst>
-                              <p:par>
-                                <p:cTn id="35" presetID="53" presetClass="entr" presetSubtype="0" fill="hold" grpId="0" nodeType="afterEffect">
-                                  <p:stCondLst>
-                                    <p:cond delay="0"/>
-                                  </p:stCondLst>
-                                  <p:childTnLst>
-                                    <p:set>
-                                      <p:cBhvr>
-                                        <p:cTn id="36" dur="1" fill="hold">
-                                          <p:stCondLst>
-                                            <p:cond delay="0"/>
-                                          </p:stCondLst>
-                                        </p:cTn>
-                                        <p:tgtEl>
-                                          <p:spTgt spid="22"/>
-                                        </p:tgtEl>
-                                        <p:attrNameLst>
-                                          <p:attrName>style.visibility</p:attrName>
-                                        </p:attrNameLst>
-                                      </p:cBhvr>
-                                      <p:to>
-                                        <p:strVal val="visible"/>
-                                      </p:to>
-                                    </p:set>
-                                    <p:anim calcmode="lin" valueType="num">
-                                      <p:cBhvr>
-                                        <p:cTn id="37" dur="500" fill="hold"/>
-                                        <p:tgtEl>
-                                          <p:spTgt spid="22"/>
-                                        </p:tgtEl>
-                                        <p:attrNameLst>
-                                          <p:attrName>ppt_w</p:attrName>
-                                        </p:attrNameLst>
-                                      </p:cBhvr>
-                                      <p:tavLst>
-                                        <p:tav tm="0">
-                                          <p:val>
-                                            <p:fltVal val="0"/>
-                                          </p:val>
-                                        </p:tav>
-                                        <p:tav tm="100000">
-                                          <p:val>
-                                            <p:strVal val="#ppt_w"/>
-                                          </p:val>
-                                        </p:tav>
-                                      </p:tavLst>
-                                    </p:anim>
-                                    <p:anim calcmode="lin" valueType="num">
-                                      <p:cBhvr>
-                                        <p:cTn id="38" dur="500" fill="hold"/>
-                                        <p:tgtEl>
-                                          <p:spTgt spid="22"/>
-                                        </p:tgtEl>
-                                        <p:attrNameLst>
-                                          <p:attrName>ppt_h</p:attrName>
-                                        </p:attrNameLst>
-                                      </p:cBhvr>
-                                      <p:tavLst>
-                                        <p:tav tm="0">
-                                          <p:val>
-                                            <p:fltVal val="0"/>
-                                          </p:val>
-                                        </p:tav>
-                                        <p:tav tm="100000">
-                                          <p:val>
-                                            <p:strVal val="#ppt_h"/>
-                                          </p:val>
-                                        </p:tav>
-                                      </p:tavLst>
-                                    </p:anim>
-                                    <p:animEffect transition="in" filter="fade">
-                                      <p:cBhvr>
-                                        <p:cTn id="39" dur="500"/>
-                                        <p:tgtEl>
-                                          <p:spTgt spid="22"/>
-                                        </p:tgtEl>
-                                      </p:cBhvr>
-                                    </p:animEffect>
-                                  </p:childTnLst>
-                                </p:cTn>
-                              </p:par>
-                            </p:childTnLst>
-                          </p:cTn>
-                        </p:par>
-                        <p:par>
-                          <p:cTn id="40" fill="hold">
-                            <p:stCondLst>
-                              <p:cond delay="3500"/>
-                            </p:stCondLst>
-                            <p:childTnLst>
-                              <p:par>
-                                <p:cTn id="41" presetID="53" presetClass="entr" presetSubtype="0" fill="hold" nodeType="afterEffect">
-                                  <p:stCondLst>
-                                    <p:cond delay="0"/>
-                                  </p:stCondLst>
-                                  <p:childTnLst>
-                                    <p:set>
-                                      <p:cBhvr>
-                                        <p:cTn id="42" dur="1" fill="hold">
-                                          <p:stCondLst>
-                                            <p:cond delay="0"/>
-                                          </p:stCondLst>
-                                        </p:cTn>
-                                        <p:tgtEl>
-                                          <p:spTgt spid="23"/>
-                                        </p:tgtEl>
-                                        <p:attrNameLst>
-                                          <p:attrName>style.visibility</p:attrName>
-                                        </p:attrNameLst>
-                                      </p:cBhvr>
-                                      <p:to>
-                                        <p:strVal val="visible"/>
-                                      </p:to>
-                                    </p:set>
-                                    <p:anim calcmode="lin" valueType="num">
-                                      <p:cBhvr>
-                                        <p:cTn id="43" dur="500" fill="hold"/>
-                                        <p:tgtEl>
-                                          <p:spTgt spid="23"/>
-                                        </p:tgtEl>
-                                        <p:attrNameLst>
-                                          <p:attrName>ppt_w</p:attrName>
-                                        </p:attrNameLst>
-                                      </p:cBhvr>
-                                      <p:tavLst>
-                                        <p:tav tm="0">
-                                          <p:val>
-                                            <p:fltVal val="0"/>
-                                          </p:val>
-                                        </p:tav>
-                                        <p:tav tm="100000">
-                                          <p:val>
-                                            <p:strVal val="#ppt_w"/>
-                                          </p:val>
-                                        </p:tav>
-                                      </p:tavLst>
-                                    </p:anim>
-                                    <p:anim calcmode="lin" valueType="num">
-                                      <p:cBhvr>
-                                        <p:cTn id="44" dur="500" fill="hold"/>
-                                        <p:tgtEl>
-                                          <p:spTgt spid="23"/>
-                                        </p:tgtEl>
-                                        <p:attrNameLst>
-                                          <p:attrName>ppt_h</p:attrName>
-                                        </p:attrNameLst>
-                                      </p:cBhvr>
-                                      <p:tavLst>
-                                        <p:tav tm="0">
-                                          <p:val>
-                                            <p:fltVal val="0"/>
-                                          </p:val>
-                                        </p:tav>
-                                        <p:tav tm="100000">
-                                          <p:val>
-                                            <p:strVal val="#ppt_h"/>
-                                          </p:val>
-                                        </p:tav>
-                                      </p:tavLst>
-                                    </p:anim>
-                                    <p:animEffect transition="in" filter="fade">
-                                      <p:cBhvr>
-                                        <p:cTn id="45" dur="500"/>
-                                        <p:tgtEl>
-                                          <p:spTgt spid="23"/>
-                                        </p:tgtEl>
-                                      </p:cBhvr>
-                                    </p:animEffect>
-                                  </p:childTnLst>
-                                </p:cTn>
-                              </p:par>
-                            </p:childTnLst>
-                          </p:cTn>
-                        </p:par>
-                        <p:par>
-                          <p:cTn id="46" fill="hold">
-                            <p:stCondLst>
-                              <p:cond delay="4000"/>
-                            </p:stCondLst>
-                            <p:childTnLst>
-                              <p:par>
-                                <p:cTn id="47" presetID="53" presetClass="entr" presetSubtype="0" fill="hold" nodeType="afterEffect">
-                                  <p:stCondLst>
-                                    <p:cond delay="0"/>
-                                  </p:stCondLst>
-                                  <p:childTnLst>
-                                    <p:set>
-                                      <p:cBhvr>
-                                        <p:cTn id="48" dur="1" fill="hold">
-                                          <p:stCondLst>
-                                            <p:cond delay="0"/>
-                                          </p:stCondLst>
-                                        </p:cTn>
-                                        <p:tgtEl>
-                                          <p:spTgt spid="26"/>
-                                        </p:tgtEl>
-                                        <p:attrNameLst>
-                                          <p:attrName>style.visibility</p:attrName>
-                                        </p:attrNameLst>
-                                      </p:cBhvr>
-                                      <p:to>
-                                        <p:strVal val="visible"/>
-                                      </p:to>
-                                    </p:set>
-                                    <p:anim calcmode="lin" valueType="num">
-                                      <p:cBhvr>
-                                        <p:cTn id="49" dur="500" fill="hold"/>
-                                        <p:tgtEl>
-                                          <p:spTgt spid="26"/>
-                                        </p:tgtEl>
-                                        <p:attrNameLst>
-                                          <p:attrName>ppt_w</p:attrName>
-                                        </p:attrNameLst>
-                                      </p:cBhvr>
-                                      <p:tavLst>
-                                        <p:tav tm="0">
-                                          <p:val>
-                                            <p:fltVal val="0"/>
-                                          </p:val>
-                                        </p:tav>
-                                        <p:tav tm="100000">
-                                          <p:val>
-                                            <p:strVal val="#ppt_w"/>
-                                          </p:val>
-                                        </p:tav>
-                                      </p:tavLst>
-                                    </p:anim>
-                                    <p:anim calcmode="lin" valueType="num">
-                                      <p:cBhvr>
-                                        <p:cTn id="50" dur="500" fill="hold"/>
-                                        <p:tgtEl>
-                                          <p:spTgt spid="26"/>
-                                        </p:tgtEl>
-                                        <p:attrNameLst>
-                                          <p:attrName>ppt_h</p:attrName>
-                                        </p:attrNameLst>
-                                      </p:cBhvr>
-                                      <p:tavLst>
-                                        <p:tav tm="0">
-                                          <p:val>
-                                            <p:fltVal val="0"/>
-                                          </p:val>
-                                        </p:tav>
-                                        <p:tav tm="100000">
-                                          <p:val>
-                                            <p:strVal val="#ppt_h"/>
-                                          </p:val>
-                                        </p:tav>
-                                      </p:tavLst>
-                                    </p:anim>
-                                    <p:animEffect transition="in" filter="fade">
-                                      <p:cBhvr>
-                                        <p:cTn id="51" dur="500"/>
-                                        <p:tgtEl>
-                                          <p:spTgt spid="26"/>
-                                        </p:tgtEl>
-                                      </p:cBhvr>
-                                    </p:animEffect>
-                                  </p:childTnLst>
-                                </p:cTn>
-                              </p:par>
-                            </p:childTnLst>
-                          </p:cTn>
-                        </p:par>
                       </p:childTnLst>
                     </p:cTn>
                   </p:par>
@@ -16179,7 +14332,6 @@
       </p:par>
     </p:tnLst>
     <p:bldLst>
-      <p:bldP spid="22" grpId="0" animBg="1"/>
       <p:bldP spid="30" grpId="0" animBg="1"/>
       <p:bldP spid="31" grpId="0" animBg="1"/>
       <p:bldP spid="32" grpId="0" animBg="1"/>
@@ -16253,6 +14405,15 @@
         <p:txBody>
           <a:bodyPr/>
           <a:lstStyle/>
+          <a:p>
+            <a:r>
+              <a:rPr lang="fr-FR" dirty="0"/>
+              <a:t>Backoffice</a:t>
+            </a:r>
+          </a:p>
+          <a:p>
+            <a:endParaRPr lang="fr-FR" dirty="0"/>
+          </a:p>
           <a:p>
             <a:endParaRPr lang="fr-FR" dirty="0"/>
           </a:p>

</xml_diff>

<commit_message>
Ajout de restrictions d'accès
Ajout de restrictions d'accès sur l'administration
Ajout de style pour la liste et le détail d'article
Rédaction du document et de la présentation orale
</commit_message>
<xml_diff>
--- a/Presentation_oral_LIEUTAUD_CELINE.pptx
+++ b/Presentation_oral_LIEUTAUD_CELINE.pptx
@@ -11687,6 +11687,67 @@
           </a:p>
         </p:txBody>
       </p:sp>
+      <p:sp>
+        <p:nvSpPr>
+          <p:cNvPr id="11" name="Oval 10">
+            <a:extLst>
+              <a:ext uri="{FF2B5EF4-FFF2-40B4-BE49-F238E27FC236}">
+                <a16:creationId xmlns:a16="http://schemas.microsoft.com/office/drawing/2014/main" id="{580FE95D-D0F1-4332-A2A6-902150890EE2}"/>
+              </a:ext>
+            </a:extLst>
+          </p:cNvPr>
+          <p:cNvSpPr/>
+          <p:nvPr/>
+        </p:nvSpPr>
+        <p:spPr>
+          <a:xfrm>
+            <a:off x="221942" y="6275609"/>
+            <a:ext cx="360960" cy="364888"/>
+          </a:xfrm>
+          <a:prstGeom prst="ellipse">
+            <a:avLst/>
+          </a:prstGeom>
+          <a:solidFill>
+            <a:schemeClr val="tx1"/>
+          </a:solidFill>
+          <a:ln>
+            <a:solidFill>
+              <a:schemeClr val="tx1"/>
+            </a:solidFill>
+          </a:ln>
+        </p:spPr>
+        <p:style>
+          <a:lnRef idx="2">
+            <a:schemeClr val="accent1">
+              <a:shade val="50000"/>
+            </a:schemeClr>
+          </a:lnRef>
+          <a:fillRef idx="1">
+            <a:schemeClr val="accent1"/>
+          </a:fillRef>
+          <a:effectRef idx="0">
+            <a:schemeClr val="accent1"/>
+          </a:effectRef>
+          <a:fontRef idx="minor">
+            <a:schemeClr val="lt1"/>
+          </a:fontRef>
+        </p:style>
+        <p:txBody>
+          <a:bodyPr rtlCol="0" anchor="ctr"/>
+          <a:lstStyle/>
+          <a:p>
+            <a:pPr algn="ctr"/>
+            <a:r>
+              <a:rPr lang="fr-FR" dirty="0">
+                <a:solidFill>
+                  <a:schemeClr val="bg1"/>
+                </a:solidFill>
+              </a:rPr>
+              <a:t>1</a:t>
+            </a:r>
+          </a:p>
+        </p:txBody>
+      </p:sp>
     </p:spTree>
     <p:extLst>
       <p:ext uri="{BB962C8B-B14F-4D97-AF65-F5344CB8AC3E}">
@@ -13147,7 +13208,7 @@
         </p:nvSpPr>
         <p:spPr>
           <a:xfrm>
-            <a:off x="4724143" y="1648122"/>
+            <a:off x="2859082" y="2860325"/>
             <a:ext cx="2743720" cy="2743719"/>
           </a:xfrm>
           <a:prstGeom prst="ellipse">
@@ -13208,7 +13269,7 @@
         </p:nvSpPr>
         <p:spPr>
           <a:xfrm>
-            <a:off x="5714167" y="3362947"/>
+            <a:off x="6429784" y="2786021"/>
             <a:ext cx="2743720" cy="2743719"/>
           </a:xfrm>
           <a:prstGeom prst="ellipse">
@@ -13264,169 +13325,6 @@
       </p:sp>
       <p:sp>
         <p:nvSpPr>
-          <p:cNvPr id="18" name="Oval 17">
-            <a:extLst>
-              <a:ext uri="{FF2B5EF4-FFF2-40B4-BE49-F238E27FC236}">
-                <a16:creationId xmlns:a16="http://schemas.microsoft.com/office/drawing/2014/main" id="{C8C7B95E-58A7-46D7-9DEB-4FEB54EE3D5E}"/>
-              </a:ext>
-            </a:extLst>
-          </p:cNvPr>
-          <p:cNvSpPr/>
-          <p:nvPr/>
-        </p:nvSpPr>
-        <p:spPr>
-          <a:xfrm>
-            <a:off x="3734116" y="3362947"/>
-            <a:ext cx="2743720" cy="2743719"/>
-          </a:xfrm>
-          <a:prstGeom prst="ellipse">
-            <a:avLst/>
-          </a:prstGeom>
-          <a:solidFill>
-            <a:schemeClr val="accent2">
-              <a:alpha val="70000"/>
-            </a:schemeClr>
-          </a:solidFill>
-          <a:ln>
-            <a:noFill/>
-          </a:ln>
-        </p:spPr>
-        <p:style>
-          <a:lnRef idx="2">
-            <a:schemeClr val="lt1">
-              <a:hueOff val="0"/>
-              <a:satOff val="0"/>
-              <a:lumOff val="0"/>
-              <a:alphaOff val="0"/>
-            </a:schemeClr>
-          </a:lnRef>
-          <a:fillRef idx="1">
-            <a:schemeClr val="accent1">
-              <a:alpha val="50000"/>
-              <a:hueOff val="0"/>
-              <a:satOff val="0"/>
-              <a:lumOff val="0"/>
-              <a:alphaOff val="0"/>
-            </a:schemeClr>
-          </a:fillRef>
-          <a:effectRef idx="0">
-            <a:schemeClr val="accent1">
-              <a:alpha val="50000"/>
-              <a:hueOff val="0"/>
-              <a:satOff val="0"/>
-              <a:lumOff val="0"/>
-              <a:alphaOff val="0"/>
-            </a:schemeClr>
-          </a:effectRef>
-          <a:fontRef idx="minor">
-            <a:schemeClr val="tx1"/>
-          </a:fontRef>
-        </p:style>
-        <p:txBody>
-          <a:bodyPr/>
-          <a:lstStyle/>
-          <a:p>
-            <a:endParaRPr lang="fr-FR" dirty="0"/>
-          </a:p>
-        </p:txBody>
-      </p:sp>
-      <p:sp>
-        <p:nvSpPr>
-          <p:cNvPr id="19" name="Text Placeholder 3">
-            <a:extLst>
-              <a:ext uri="{FF2B5EF4-FFF2-40B4-BE49-F238E27FC236}">
-                <a16:creationId xmlns:a16="http://schemas.microsoft.com/office/drawing/2014/main" id="{386F0BC6-C803-4A5A-A5E4-C9FBA5B9104F}"/>
-              </a:ext>
-            </a:extLst>
-          </p:cNvPr>
-          <p:cNvSpPr txBox="1">
-            <a:spLocks/>
-          </p:cNvSpPr>
-          <p:nvPr/>
-        </p:nvSpPr>
-        <p:spPr>
-          <a:xfrm>
-            <a:off x="2939341" y="5428648"/>
-            <a:ext cx="689291" cy="287323"/>
-          </a:xfrm>
-          <a:prstGeom prst="rect">
-            <a:avLst/>
-          </a:prstGeom>
-        </p:spPr>
-        <p:txBody>
-          <a:bodyPr wrap="none" lIns="0" tIns="0" rIns="0" bIns="0" anchor="ctr" anchorCtr="0">
-            <a:spAutoFit/>
-          </a:bodyPr>
-          <a:lstStyle>
-            <a:lvl1pPr marL="0" indent="0" algn="ctr">
-              <a:buNone/>
-              <a:defRPr sz="1400" baseline="0">
-                <a:solidFill>
-                  <a:schemeClr val="tx1">
-                    <a:lumMod val="95000"/>
-                    <a:lumOff val="5000"/>
-                  </a:schemeClr>
-                </a:solidFill>
-              </a:defRPr>
-            </a:lvl1pPr>
-            <a:lvl2pPr marL="457200" indent="0">
-              <a:buNone/>
-              <a:defRPr sz="1200"/>
-            </a:lvl2pPr>
-            <a:lvl3pPr marL="914400" indent="0">
-              <a:buNone/>
-              <a:defRPr sz="1000"/>
-            </a:lvl3pPr>
-            <a:lvl4pPr marL="1371600" indent="0">
-              <a:buNone/>
-              <a:defRPr sz="900"/>
-            </a:lvl4pPr>
-            <a:lvl5pPr marL="1828800" indent="0">
-              <a:buNone/>
-              <a:defRPr sz="900"/>
-            </a:lvl5pPr>
-            <a:lvl6pPr marL="2286000" indent="0">
-              <a:buNone/>
-              <a:defRPr sz="900"/>
-            </a:lvl6pPr>
-            <a:lvl7pPr marL="2743200" indent="0">
-              <a:buNone/>
-              <a:defRPr sz="900"/>
-            </a:lvl7pPr>
-            <a:lvl8pPr marL="3200400" indent="0">
-              <a:buNone/>
-              <a:defRPr sz="900"/>
-            </a:lvl8pPr>
-            <a:lvl9pPr marL="3657600" indent="0">
-              <a:buNone/>
-              <a:defRPr sz="900"/>
-            </a:lvl9pPr>
-          </a:lstStyle>
-          <a:p>
-            <a:pPr algn="l" defTabSz="1219170">
-              <a:spcBef>
-                <a:spcPct val="20000"/>
-              </a:spcBef>
-              <a:defRPr/>
-            </a:pPr>
-            <a:r>
-              <a:rPr lang="fr-FR" sz="1867" b="1" dirty="0">
-                <a:solidFill>
-                  <a:schemeClr val="accent2"/>
-                </a:solidFill>
-              </a:rPr>
-              <a:t>REACT</a:t>
-            </a:r>
-            <a:endParaRPr lang="en-US" sz="1867" b="1" dirty="0">
-              <a:solidFill>
-                <a:schemeClr val="accent2"/>
-              </a:solidFill>
-            </a:endParaRPr>
-          </a:p>
-        </p:txBody>
-      </p:sp>
-      <p:sp>
-        <p:nvSpPr>
           <p:cNvPr id="20" name="Text Placeholder 3">
             <a:extLst>
               <a:ext uri="{FF2B5EF4-FFF2-40B4-BE49-F238E27FC236}">
@@ -13441,7 +13339,7 @@
         </p:nvSpPr>
         <p:spPr>
           <a:xfrm>
-            <a:off x="5610322" y="1388931"/>
+            <a:off x="3745264" y="2505337"/>
             <a:ext cx="971355" cy="246221"/>
           </a:xfrm>
           <a:prstGeom prst="rect">
@@ -13531,7 +13429,7 @@
         </p:nvSpPr>
         <p:spPr>
           <a:xfrm>
-            <a:off x="8737293" y="5428648"/>
+            <a:off x="7193453" y="2474154"/>
             <a:ext cx="1030731" cy="246221"/>
           </a:xfrm>
           <a:prstGeom prst="rect">
@@ -13607,61 +13505,6 @@
       </p:sp>
       <p:sp>
         <p:nvSpPr>
-          <p:cNvPr id="30" name="Left-Right Arrow 26">
-            <a:extLst>
-              <a:ext uri="{FF2B5EF4-FFF2-40B4-BE49-F238E27FC236}">
-                <a16:creationId xmlns:a16="http://schemas.microsoft.com/office/drawing/2014/main" id="{1776B325-A126-4F54-AE7B-64425059C852}"/>
-              </a:ext>
-            </a:extLst>
-          </p:cNvPr>
-          <p:cNvSpPr/>
-          <p:nvPr/>
-        </p:nvSpPr>
-        <p:spPr>
-          <a:xfrm rot="18715401">
-            <a:off x="5217232" y="3662279"/>
-            <a:ext cx="648259" cy="394141"/>
-          </a:xfrm>
-          <a:prstGeom prst="leftRightArrow">
-            <a:avLst>
-              <a:gd name="adj1" fmla="val 37655"/>
-              <a:gd name="adj2" fmla="val 47346"/>
-            </a:avLst>
-          </a:prstGeom>
-          <a:solidFill>
-            <a:schemeClr val="bg1"/>
-          </a:solidFill>
-          <a:ln>
-            <a:noFill/>
-          </a:ln>
-        </p:spPr>
-        <p:style>
-          <a:lnRef idx="2">
-            <a:schemeClr val="accent1">
-              <a:shade val="50000"/>
-            </a:schemeClr>
-          </a:lnRef>
-          <a:fillRef idx="1">
-            <a:schemeClr val="accent1"/>
-          </a:fillRef>
-          <a:effectRef idx="0">
-            <a:schemeClr val="accent1"/>
-          </a:effectRef>
-          <a:fontRef idx="minor">
-            <a:schemeClr val="lt1"/>
-          </a:fontRef>
-        </p:style>
-        <p:txBody>
-          <a:bodyPr rtlCol="0" anchor="ctr"/>
-          <a:lstStyle/>
-          <a:p>
-            <a:pPr algn="ctr"/>
-            <a:endParaRPr lang="en-US" sz="2400" dirty="0"/>
-          </a:p>
-        </p:txBody>
-      </p:sp>
-      <p:sp>
-        <p:nvSpPr>
           <p:cNvPr id="31" name="Left-Right Arrow 27">
             <a:extLst>
               <a:ext uri="{FF2B5EF4-FFF2-40B4-BE49-F238E27FC236}">
@@ -13673,64 +13516,9 @@
           <p:nvPr/>
         </p:nvSpPr>
         <p:spPr>
-          <a:xfrm rot="2884599" flipV="1">
-            <a:off x="6294167" y="3662279"/>
-            <a:ext cx="648259" cy="394141"/>
-          </a:xfrm>
-          <a:prstGeom prst="leftRightArrow">
-            <a:avLst>
-              <a:gd name="adj1" fmla="val 37655"/>
-              <a:gd name="adj2" fmla="val 47346"/>
-            </a:avLst>
-          </a:prstGeom>
-          <a:solidFill>
-            <a:schemeClr val="bg1"/>
-          </a:solidFill>
-          <a:ln>
-            <a:noFill/>
-          </a:ln>
-        </p:spPr>
-        <p:style>
-          <a:lnRef idx="2">
-            <a:schemeClr val="accent1">
-              <a:shade val="50000"/>
-            </a:schemeClr>
-          </a:lnRef>
-          <a:fillRef idx="1">
-            <a:schemeClr val="accent1"/>
-          </a:fillRef>
-          <a:effectRef idx="0">
-            <a:schemeClr val="accent1"/>
-          </a:effectRef>
-          <a:fontRef idx="minor">
-            <a:schemeClr val="lt1"/>
-          </a:fontRef>
-        </p:style>
-        <p:txBody>
-          <a:bodyPr rtlCol="0" anchor="ctr"/>
-          <a:lstStyle/>
-          <a:p>
-            <a:pPr algn="ctr"/>
-            <a:endParaRPr lang="en-US" sz="2400" dirty="0"/>
-          </a:p>
-        </p:txBody>
-      </p:sp>
-      <p:sp>
-        <p:nvSpPr>
-          <p:cNvPr id="32" name="Left-Right Arrow 28">
-            <a:extLst>
-              <a:ext uri="{FF2B5EF4-FFF2-40B4-BE49-F238E27FC236}">
-                <a16:creationId xmlns:a16="http://schemas.microsoft.com/office/drawing/2014/main" id="{328C46AD-0088-4936-8DD5-12AAC9552CC8}"/>
-              </a:ext>
-            </a:extLst>
-          </p:cNvPr>
-          <p:cNvSpPr/>
-          <p:nvPr/>
-        </p:nvSpPr>
-        <p:spPr>
-          <a:xfrm>
-            <a:off x="5773251" y="4552579"/>
-            <a:ext cx="648259" cy="394141"/>
+          <a:xfrm flipV="1">
+            <a:off x="5064521" y="3960807"/>
+            <a:ext cx="1773601" cy="394141"/>
           </a:xfrm>
           <a:prstGeom prst="leftRightArrow">
             <a:avLst>
@@ -13798,7 +13586,7 @@
         </p:blipFill>
         <p:spPr>
           <a:xfrm>
-            <a:off x="5477430" y="2278769"/>
+            <a:off x="3612369" y="3490972"/>
             <a:ext cx="1252232" cy="1252232"/>
           </a:xfrm>
           <a:prstGeom prst="rect">
@@ -13808,10 +13596,10 @@
       </p:pic>
       <p:pic>
         <p:nvPicPr>
-          <p:cNvPr id="7" name="Picture 6" descr="Icon&#10;&#10;Description automatically generated">
+          <p:cNvPr id="9" name="Picture 8" descr="Logo&#10;&#10;Description automatically generated">
             <a:extLst>
               <a:ext uri="{FF2B5EF4-FFF2-40B4-BE49-F238E27FC236}">
-                <a16:creationId xmlns:a16="http://schemas.microsoft.com/office/drawing/2014/main" id="{46ECA4D7-E397-44CD-AD6D-BFCD0DDBD01D}"/>
+                <a16:creationId xmlns:a16="http://schemas.microsoft.com/office/drawing/2014/main" id="{FDA3EE7F-1B9E-4A84-B457-003324634A0A}"/>
               </a:ext>
             </a:extLst>
           </p:cNvPr>
@@ -13834,43 +13622,7 @@
         </p:blipFill>
         <p:spPr>
           <a:xfrm>
-            <a:off x="4252754" y="4148985"/>
-            <a:ext cx="1636674" cy="1155901"/>
-          </a:xfrm>
-          <a:prstGeom prst="rect">
-            <a:avLst/>
-          </a:prstGeom>
-        </p:spPr>
-      </p:pic>
-      <p:pic>
-        <p:nvPicPr>
-          <p:cNvPr id="9" name="Picture 8" descr="Logo&#10;&#10;Description automatically generated">
-            <a:extLst>
-              <a:ext uri="{FF2B5EF4-FFF2-40B4-BE49-F238E27FC236}">
-                <a16:creationId xmlns:a16="http://schemas.microsoft.com/office/drawing/2014/main" id="{FDA3EE7F-1B9E-4A84-B457-003324634A0A}"/>
-              </a:ext>
-            </a:extLst>
-          </p:cNvPr>
-          <p:cNvPicPr>
-            <a:picLocks noChangeAspect="1"/>
-          </p:cNvPicPr>
-          <p:nvPr/>
-        </p:nvPicPr>
-        <p:blipFill>
-          <a:blip r:embed="rId4">
-            <a:extLst>
-              <a:ext uri="{28A0092B-C50C-407E-A947-70E740481C1C}">
-                <a14:useLocalDpi xmlns:a14="http://schemas.microsoft.com/office/drawing/2010/main" val="0"/>
-              </a:ext>
-            </a:extLst>
-          </a:blip>
-          <a:stretch>
-            <a:fillRect/>
-          </a:stretch>
-        </p:blipFill>
-        <p:spPr>
-          <a:xfrm>
-            <a:off x="6477836" y="4161648"/>
+            <a:off x="7126514" y="3526463"/>
             <a:ext cx="1350260" cy="1012695"/>
           </a:xfrm>
           <a:prstGeom prst="rect">
@@ -14015,7 +13767,7 @@
                                           </p:stCondLst>
                                         </p:cTn>
                                         <p:tgtEl>
-                                          <p:spTgt spid="18"/>
+                                          <p:spTgt spid="16"/>
                                         </p:tgtEl>
                                         <p:attrNameLst>
                                           <p:attrName>style.visibility</p:attrName>
@@ -14029,7 +13781,7 @@
                                       <p:cBhvr>
                                         <p:cTn id="13" dur="500" fill="hold"/>
                                         <p:tgtEl>
-                                          <p:spTgt spid="18"/>
+                                          <p:spTgt spid="16"/>
                                         </p:tgtEl>
                                         <p:attrNameLst>
                                           <p:attrName>ppt_w</p:attrName>
@@ -14052,7 +13804,7 @@
                                       <p:cBhvr>
                                         <p:cTn id="14" dur="500" fill="hold"/>
                                         <p:tgtEl>
-                                          <p:spTgt spid="18"/>
+                                          <p:spTgt spid="16"/>
                                         </p:tgtEl>
                                         <p:attrNameLst>
                                           <p:attrName>ppt_h</p:attrName>
@@ -14075,7 +13827,7 @@
                                       <p:cBhvr>
                                         <p:cTn id="15" dur="500"/>
                                         <p:tgtEl>
-                                          <p:spTgt spid="18"/>
+                                          <p:spTgt spid="16"/>
                                         </p:tgtEl>
                                       </p:cBhvr>
                                     </p:animEffect>
@@ -14092,7 +13844,7 @@
                             </p:stCondLst>
                             <p:childTnLst>
                               <p:par>
-                                <p:cTn id="17" presetID="53" presetClass="entr" presetSubtype="0" fill="hold" nodeType="afterEffect">
+                                <p:cTn id="17" presetID="22" presetClass="entr" presetSubtype="4" fill="hold" grpId="0" nodeType="afterEffect">
                                   <p:stCondLst>
                                     <p:cond delay="0"/>
                                   </p:stCondLst>
@@ -14100,140 +13852,6 @@
                                     <p:set>
                                       <p:cBhvr>
                                         <p:cTn id="18" dur="1" fill="hold">
-                                          <p:stCondLst>
-                                            <p:cond delay="0"/>
-                                          </p:stCondLst>
-                                        </p:cTn>
-                                        <p:tgtEl>
-                                          <p:spTgt spid="16"/>
-                                        </p:tgtEl>
-                                        <p:attrNameLst>
-                                          <p:attrName>style.visibility</p:attrName>
-                                        </p:attrNameLst>
-                                      </p:cBhvr>
-                                      <p:to>
-                                        <p:strVal val="visible"/>
-                                      </p:to>
-                                    </p:set>
-                                    <p:anim calcmode="lin" valueType="num">
-                                      <p:cBhvr>
-                                        <p:cTn id="19" dur="500" fill="hold"/>
-                                        <p:tgtEl>
-                                          <p:spTgt spid="16"/>
-                                        </p:tgtEl>
-                                        <p:attrNameLst>
-                                          <p:attrName>ppt_w</p:attrName>
-                                        </p:attrNameLst>
-                                      </p:cBhvr>
-                                      <p:tavLst>
-                                        <p:tav tm="0">
-                                          <p:val>
-                                            <p:fltVal val="0"/>
-                                          </p:val>
-                                        </p:tav>
-                                        <p:tav tm="100000">
-                                          <p:val>
-                                            <p:strVal val="#ppt_w"/>
-                                          </p:val>
-                                        </p:tav>
-                                      </p:tavLst>
-                                    </p:anim>
-                                    <p:anim calcmode="lin" valueType="num">
-                                      <p:cBhvr>
-                                        <p:cTn id="20" dur="500" fill="hold"/>
-                                        <p:tgtEl>
-                                          <p:spTgt spid="16"/>
-                                        </p:tgtEl>
-                                        <p:attrNameLst>
-                                          <p:attrName>ppt_h</p:attrName>
-                                        </p:attrNameLst>
-                                      </p:cBhvr>
-                                      <p:tavLst>
-                                        <p:tav tm="0">
-                                          <p:val>
-                                            <p:fltVal val="0"/>
-                                          </p:val>
-                                        </p:tav>
-                                        <p:tav tm="100000">
-                                          <p:val>
-                                            <p:strVal val="#ppt_h"/>
-                                          </p:val>
-                                        </p:tav>
-                                      </p:tavLst>
-                                    </p:anim>
-                                    <p:animEffect transition="in" filter="fade">
-                                      <p:cBhvr>
-                                        <p:cTn id="21" dur="500"/>
-                                        <p:tgtEl>
-                                          <p:spTgt spid="16"/>
-                                        </p:tgtEl>
-                                      </p:cBhvr>
-                                    </p:animEffect>
-                                  </p:childTnLst>
-                                </p:cTn>
-                              </p:par>
-                            </p:childTnLst>
-                          </p:cTn>
-                        </p:par>
-                        <p:par>
-                          <p:cTn id="22" fill="hold">
-                            <p:stCondLst>
-                              <p:cond delay="1500"/>
-                            </p:stCondLst>
-                            <p:childTnLst>
-                              <p:par>
-                                <p:cTn id="23" presetID="22" presetClass="entr" presetSubtype="4" fill="hold" grpId="0" nodeType="afterEffect">
-                                  <p:stCondLst>
-                                    <p:cond delay="0"/>
-                                  </p:stCondLst>
-                                  <p:childTnLst>
-                                    <p:set>
-                                      <p:cBhvr>
-                                        <p:cTn id="24" dur="1" fill="hold">
-                                          <p:stCondLst>
-                                            <p:cond delay="0"/>
-                                          </p:stCondLst>
-                                        </p:cTn>
-                                        <p:tgtEl>
-                                          <p:spTgt spid="30"/>
-                                        </p:tgtEl>
-                                        <p:attrNameLst>
-                                          <p:attrName>style.visibility</p:attrName>
-                                        </p:attrNameLst>
-                                      </p:cBhvr>
-                                      <p:to>
-                                        <p:strVal val="visible"/>
-                                      </p:to>
-                                    </p:set>
-                                    <p:animEffect transition="in" filter="wipe(down)">
-                                      <p:cBhvr>
-                                        <p:cTn id="25" dur="500"/>
-                                        <p:tgtEl>
-                                          <p:spTgt spid="30"/>
-                                        </p:tgtEl>
-                                      </p:cBhvr>
-                                    </p:animEffect>
-                                  </p:childTnLst>
-                                </p:cTn>
-                              </p:par>
-                            </p:childTnLst>
-                          </p:cTn>
-                        </p:par>
-                        <p:par>
-                          <p:cTn id="26" fill="hold">
-                            <p:stCondLst>
-                              <p:cond delay="2000"/>
-                            </p:stCondLst>
-                            <p:childTnLst>
-                              <p:par>
-                                <p:cTn id="27" presetID="22" presetClass="entr" presetSubtype="4" fill="hold" grpId="0" nodeType="afterEffect">
-                                  <p:stCondLst>
-                                    <p:cond delay="0"/>
-                                  </p:stCondLst>
-                                  <p:childTnLst>
-                                    <p:set>
-                                      <p:cBhvr>
-                                        <p:cTn id="28" dur="1" fill="hold">
                                           <p:stCondLst>
                                             <p:cond delay="0"/>
                                           </p:stCondLst>
@@ -14251,53 +13869,9 @@
                                     </p:set>
                                     <p:animEffect transition="in" filter="wipe(down)">
                                       <p:cBhvr>
-                                        <p:cTn id="29" dur="500"/>
+                                        <p:cTn id="19" dur="500"/>
                                         <p:tgtEl>
                                           <p:spTgt spid="31"/>
-                                        </p:tgtEl>
-                                      </p:cBhvr>
-                                    </p:animEffect>
-                                  </p:childTnLst>
-                                </p:cTn>
-                              </p:par>
-                            </p:childTnLst>
-                          </p:cTn>
-                        </p:par>
-                        <p:par>
-                          <p:cTn id="30" fill="hold">
-                            <p:stCondLst>
-                              <p:cond delay="2500"/>
-                            </p:stCondLst>
-                            <p:childTnLst>
-                              <p:par>
-                                <p:cTn id="31" presetID="16" presetClass="entr" presetSubtype="37" fill="hold" grpId="0" nodeType="afterEffect">
-                                  <p:stCondLst>
-                                    <p:cond delay="0"/>
-                                  </p:stCondLst>
-                                  <p:childTnLst>
-                                    <p:set>
-                                      <p:cBhvr>
-                                        <p:cTn id="32" dur="1" fill="hold">
-                                          <p:stCondLst>
-                                            <p:cond delay="0"/>
-                                          </p:stCondLst>
-                                        </p:cTn>
-                                        <p:tgtEl>
-                                          <p:spTgt spid="32"/>
-                                        </p:tgtEl>
-                                        <p:attrNameLst>
-                                          <p:attrName>style.visibility</p:attrName>
-                                        </p:attrNameLst>
-                                      </p:cBhvr>
-                                      <p:to>
-                                        <p:strVal val="visible"/>
-                                      </p:to>
-                                    </p:set>
-                                    <p:animEffect transition="in" filter="barn(outVertical)">
-                                      <p:cBhvr>
-                                        <p:cTn id="33" dur="500"/>
-                                        <p:tgtEl>
-                                          <p:spTgt spid="32"/>
                                         </p:tgtEl>
                                       </p:cBhvr>
                                     </p:animEffect>
@@ -14332,9 +13906,7 @@
       </p:par>
     </p:tnLst>
     <p:bldLst>
-      <p:bldP spid="30" grpId="0" animBg="1"/>
       <p:bldP spid="31" grpId="0" animBg="1"/>
-      <p:bldP spid="32" grpId="0" animBg="1"/>
     </p:bldLst>
   </p:timing>
 </p:sld>
@@ -14343,6 +13915,14 @@
 <file path=ppt/slides/slide4.xml><?xml version="1.0" encoding="utf-8"?>
 <p:sld xmlns:a="http://schemas.openxmlformats.org/drawingml/2006/main" xmlns:r="http://schemas.openxmlformats.org/officeDocument/2006/relationships" xmlns:p="http://schemas.openxmlformats.org/presentationml/2006/main">
   <p:cSld>
+    <p:bg>
+      <p:bgPr>
+        <a:solidFill>
+          <a:schemeClr val="bg2"/>
+        </a:solidFill>
+        <a:effectLst/>
+      </p:bgPr>
+    </p:bg>
     <p:spTree>
       <p:nvGrpSpPr>
         <p:cNvPr id="1" name=""/>
@@ -14357,6 +13937,82 @@
           <a:chExt cx="0" cy="0"/>
         </a:xfrm>
       </p:grpSpPr>
+      <p:sp useBgFill="1">
+        <p:nvSpPr>
+          <p:cNvPr id="39" name="Rectangle 7">
+            <a:extLst>
+              <a:ext uri="{FF2B5EF4-FFF2-40B4-BE49-F238E27FC236}">
+                <a16:creationId xmlns:a16="http://schemas.microsoft.com/office/drawing/2014/main" id="{A5931BE0-4B93-4D6C-878E-ACC59D6B4587}"/>
+              </a:ext>
+              <a:ext uri="{C183D7F6-B498-43B3-948B-1728B52AA6E4}">
+                <adec:decorative xmlns:adec="http://schemas.microsoft.com/office/drawing/2017/decorative" val="1"/>
+              </a:ext>
+            </a:extLst>
+          </p:cNvPr>
+          <p:cNvSpPr>
+            <a:spLocks noGrp="1" noRot="1" noChangeAspect="1" noMove="1" noResize="1" noEditPoints="1" noAdjustHandles="1" noChangeArrowheads="1" noChangeShapeType="1" noTextEdit="1"/>
+          </p:cNvSpPr>
+          <p:nvPr>
+            <p:extLst>
+              <p:ext uri="{386F3935-93C4-4BCD-93E2-E3B085C9AB24}">
+                <p16:designElem xmlns:p16="http://schemas.microsoft.com/office/powerpoint/2015/main" val="1"/>
+              </p:ext>
+            </p:extLst>
+          </p:nvPr>
+        </p:nvSpPr>
+        <p:spPr>
+          <a:xfrm>
+            <a:off x="0" y="0"/>
+            <a:ext cx="12192000" cy="6858000"/>
+          </a:xfrm>
+          <a:prstGeom prst="rect">
+            <a:avLst/>
+          </a:prstGeom>
+          <a:ln w="12700" cap="flat" cmpd="sng" algn="ctr">
+            <a:noFill/>
+            <a:prstDash val="solid"/>
+            <a:miter lim="800000"/>
+          </a:ln>
+          <a:effectLst/>
+          <a:extLst>
+            <a:ext uri="{91240B29-F687-4F45-9708-019B960494DF}">
+              <a14:hiddenLine xmlns:a14="http://schemas.microsoft.com/office/drawing/2010/main" w="12700" cap="flat" cmpd="sng" algn="ctr">
+                <a:solidFill>
+                  <a:schemeClr val="accent1">
+                    <a:shade val="50000"/>
+                  </a:schemeClr>
+                </a:solidFill>
+                <a:prstDash val="solid"/>
+                <a:miter lim="800000"/>
+              </a14:hiddenLine>
+            </a:ext>
+          </a:extLst>
+        </p:spPr>
+        <p:style>
+          <a:lnRef idx="2">
+            <a:schemeClr val="accent1">
+              <a:shade val="50000"/>
+            </a:schemeClr>
+          </a:lnRef>
+          <a:fillRef idx="1">
+            <a:schemeClr val="accent1"/>
+          </a:fillRef>
+          <a:effectRef idx="0">
+            <a:schemeClr val="accent1"/>
+          </a:effectRef>
+          <a:fontRef idx="minor">
+            <a:schemeClr val="lt1"/>
+          </a:fontRef>
+        </p:style>
+        <p:txBody>
+          <a:bodyPr rtlCol="0" anchor="ctr"/>
+          <a:lstStyle/>
+          <a:p>
+            <a:pPr algn="ctr"/>
+            <a:endParaRPr lang="en-US"/>
+          </a:p>
+        </p:txBody>
+      </p:sp>
       <p:sp>
         <p:nvSpPr>
           <p:cNvPr id="2" name="Title 1">
@@ -14373,15 +14029,601 @@
             <p:ph type="title"/>
           </p:nvPr>
         </p:nvSpPr>
-        <p:spPr/>
+        <p:spPr>
+          <a:xfrm>
+            <a:off x="3359149" y="1520825"/>
+            <a:ext cx="8281987" cy="1333057"/>
+          </a:xfrm>
+        </p:spPr>
         <p:txBody>
-          <a:bodyPr/>
+          <a:bodyPr wrap="square" anchor="t">
+            <a:normAutofit/>
+          </a:bodyPr>
           <a:lstStyle/>
           <a:p>
             <a:r>
-              <a:rPr lang="fr-FR" dirty="0"/>
+              <a:rPr lang="fr-FR"/>
               <a:t>FONCTIONNALITES</a:t>
             </a:r>
+            <a:endParaRPr lang="fr-FR" dirty="0"/>
+          </a:p>
+        </p:txBody>
+      </p:sp>
+      <p:sp>
+        <p:nvSpPr>
+          <p:cNvPr id="40" name="Freeform: Shape 9">
+            <a:extLst>
+              <a:ext uri="{FF2B5EF4-FFF2-40B4-BE49-F238E27FC236}">
+                <a16:creationId xmlns:a16="http://schemas.microsoft.com/office/drawing/2014/main" id="{6D438371-A37F-43CB-8166-3E9115593648}"/>
+              </a:ext>
+              <a:ext uri="{C183D7F6-B498-43B3-948B-1728B52AA6E4}">
+                <adec:decorative xmlns:adec="http://schemas.microsoft.com/office/drawing/2017/decorative" val="1"/>
+              </a:ext>
+            </a:extLst>
+          </p:cNvPr>
+          <p:cNvSpPr>
+            <a:spLocks noGrp="1" noRot="1" noChangeAspect="1" noMove="1" noResize="1" noEditPoints="1" noAdjustHandles="1" noChangeArrowheads="1" noChangeShapeType="1" noTextEdit="1"/>
+          </p:cNvSpPr>
+          <p:nvPr>
+            <p:extLst>
+              <p:ext uri="{386F3935-93C4-4BCD-93E2-E3B085C9AB24}">
+                <p16:designElem xmlns:p16="http://schemas.microsoft.com/office/powerpoint/2015/main" val="1"/>
+              </p:ext>
+            </p:extLst>
+          </p:nvPr>
+        </p:nvSpPr>
+        <p:spPr>
+          <a:xfrm rot="18900000">
+            <a:off x="274870" y="-114297"/>
+            <a:ext cx="1853969" cy="926985"/>
+          </a:xfrm>
+          <a:custGeom>
+            <a:avLst/>
+            <a:gdLst>
+              <a:gd name="connsiteX0" fmla="*/ 958943 w 1853969"/>
+              <a:gd name="connsiteY0" fmla="*/ 1614 h 926985"/>
+              <a:gd name="connsiteX1" fmla="*/ 1852355 w 1853969"/>
+              <a:gd name="connsiteY1" fmla="*/ 895026 h 926985"/>
+              <a:gd name="connsiteX2" fmla="*/ 1853969 w 1853969"/>
+              <a:gd name="connsiteY2" fmla="*/ 926985 h 926985"/>
+              <a:gd name="connsiteX3" fmla="*/ 1390476 w 1853969"/>
+              <a:gd name="connsiteY3" fmla="*/ 926985 h 926985"/>
+              <a:gd name="connsiteX4" fmla="*/ 926984 w 1853969"/>
+              <a:gd name="connsiteY4" fmla="*/ 463493 h 926985"/>
+              <a:gd name="connsiteX5" fmla="*/ 463493 w 1853969"/>
+              <a:gd name="connsiteY5" fmla="*/ 926985 h 926985"/>
+              <a:gd name="connsiteX6" fmla="*/ 0 w 1853969"/>
+              <a:gd name="connsiteY6" fmla="*/ 926985 h 926985"/>
+              <a:gd name="connsiteX7" fmla="*/ 926985 w 1853969"/>
+              <a:gd name="connsiteY7" fmla="*/ 0 h 926985"/>
+            </a:gdLst>
+            <a:ahLst/>
+            <a:cxnLst>
+              <a:cxn ang="0">
+                <a:pos x="connsiteX0" y="connsiteY0"/>
+              </a:cxn>
+              <a:cxn ang="0">
+                <a:pos x="connsiteX1" y="connsiteY1"/>
+              </a:cxn>
+              <a:cxn ang="0">
+                <a:pos x="connsiteX2" y="connsiteY2"/>
+              </a:cxn>
+              <a:cxn ang="0">
+                <a:pos x="connsiteX3" y="connsiteY3"/>
+              </a:cxn>
+              <a:cxn ang="0">
+                <a:pos x="connsiteX4" y="connsiteY4"/>
+              </a:cxn>
+              <a:cxn ang="0">
+                <a:pos x="connsiteX5" y="connsiteY5"/>
+              </a:cxn>
+              <a:cxn ang="0">
+                <a:pos x="connsiteX6" y="connsiteY6"/>
+              </a:cxn>
+              <a:cxn ang="0">
+                <a:pos x="connsiteX7" y="connsiteY7"/>
+              </a:cxn>
+            </a:cxnLst>
+            <a:rect l="l" t="t" r="r" b="b"/>
+            <a:pathLst>
+              <a:path w="1853969" h="926985">
+                <a:moveTo>
+                  <a:pt x="958943" y="1614"/>
+                </a:moveTo>
+                <a:lnTo>
+                  <a:pt x="1852355" y="895026"/>
+                </a:lnTo>
+                <a:lnTo>
+                  <a:pt x="1853969" y="926985"/>
+                </a:lnTo>
+                <a:lnTo>
+                  <a:pt x="1390476" y="926985"/>
+                </a:lnTo>
+                <a:cubicBezTo>
+                  <a:pt x="1390476" y="671005"/>
+                  <a:pt x="1182964" y="463493"/>
+                  <a:pt x="926984" y="463493"/>
+                </a:cubicBezTo>
+                <a:cubicBezTo>
+                  <a:pt x="671005" y="463493"/>
+                  <a:pt x="463493" y="671005"/>
+                  <a:pt x="463493" y="926985"/>
+                </a:cubicBezTo>
+                <a:lnTo>
+                  <a:pt x="0" y="926985"/>
+                </a:lnTo>
+                <a:cubicBezTo>
+                  <a:pt x="0" y="415026"/>
+                  <a:pt x="415025" y="0"/>
+                  <a:pt x="926985" y="0"/>
+                </a:cubicBezTo>
+                <a:close/>
+              </a:path>
+            </a:pathLst>
+          </a:custGeom>
+          <a:solidFill>
+            <a:schemeClr val="bg2"/>
+          </a:solidFill>
+          <a:ln>
+            <a:noFill/>
+          </a:ln>
+          <a:effectLst>
+            <a:innerShdw blurRad="254000" dist="50800" dir="5400000">
+              <a:schemeClr val="accent1">
+                <a:lumMod val="40000"/>
+                <a:lumOff val="60000"/>
+                <a:alpha val="40000"/>
+              </a:schemeClr>
+            </a:innerShdw>
+          </a:effectLst>
+        </p:spPr>
+        <p:style>
+          <a:lnRef idx="2">
+            <a:schemeClr val="accent1">
+              <a:shade val="50000"/>
+            </a:schemeClr>
+          </a:lnRef>
+          <a:fillRef idx="1">
+            <a:schemeClr val="accent1"/>
+          </a:fillRef>
+          <a:effectRef idx="0">
+            <a:schemeClr val="accent1"/>
+          </a:effectRef>
+          <a:fontRef idx="minor">
+            <a:schemeClr val="lt1"/>
+          </a:fontRef>
+        </p:style>
+        <p:txBody>
+          <a:bodyPr wrap="square" rtlCol="0" anchor="ctr">
+            <a:noAutofit/>
+          </a:bodyPr>
+          <a:lstStyle/>
+          <a:p>
+            <a:pPr algn="ctr"/>
+            <a:endParaRPr lang="en-US" dirty="0">
+              <a:solidFill>
+                <a:schemeClr val="tx1"/>
+              </a:solidFill>
+            </a:endParaRPr>
+          </a:p>
+        </p:txBody>
+      </p:sp>
+      <p:sp>
+        <p:nvSpPr>
+          <p:cNvPr id="41" name="Oval 11">
+            <a:extLst>
+              <a:ext uri="{FF2B5EF4-FFF2-40B4-BE49-F238E27FC236}">
+                <a16:creationId xmlns:a16="http://schemas.microsoft.com/office/drawing/2014/main" id="{2AE18936-8FC4-4357-B2D0-AEEAFF4D7029}"/>
+              </a:ext>
+              <a:ext uri="{C183D7F6-B498-43B3-948B-1728B52AA6E4}">
+                <adec:decorative xmlns:adec="http://schemas.microsoft.com/office/drawing/2017/decorative" val="1"/>
+              </a:ext>
+            </a:extLst>
+          </p:cNvPr>
+          <p:cNvSpPr>
+            <a:spLocks noGrp="1" noRot="1" noChangeAspect="1" noMove="1" noResize="1" noEditPoints="1" noAdjustHandles="1" noChangeArrowheads="1" noChangeShapeType="1" noTextEdit="1"/>
+          </p:cNvSpPr>
+          <p:nvPr>
+            <p:extLst>
+              <p:ext uri="{386F3935-93C4-4BCD-93E2-E3B085C9AB24}">
+                <p16:designElem xmlns:p16="http://schemas.microsoft.com/office/powerpoint/2015/main" val="1"/>
+              </p:ext>
+            </p:extLst>
+          </p:nvPr>
+        </p:nvSpPr>
+        <p:spPr>
+          <a:xfrm rot="2700000">
+            <a:off x="1968027" y="-45404"/>
+            <a:ext cx="107098" cy="466589"/>
+          </a:xfrm>
+          <a:prstGeom prst="ellipse">
+            <a:avLst/>
+          </a:prstGeom>
+          <a:solidFill>
+            <a:schemeClr val="bg2">
+              <a:lumMod val="90000"/>
+              <a:lumOff val="10000"/>
+            </a:schemeClr>
+          </a:solidFill>
+          <a:ln>
+            <a:noFill/>
+          </a:ln>
+          <a:effectLst>
+            <a:innerShdw blurRad="63500" dist="2540000">
+              <a:schemeClr val="accent1">
+                <a:lumMod val="60000"/>
+                <a:lumOff val="40000"/>
+                <a:alpha val="40000"/>
+              </a:schemeClr>
+            </a:innerShdw>
+          </a:effectLst>
+        </p:spPr>
+        <p:style>
+          <a:lnRef idx="2">
+            <a:schemeClr val="accent1">
+              <a:shade val="50000"/>
+            </a:schemeClr>
+          </a:lnRef>
+          <a:fillRef idx="1">
+            <a:schemeClr val="accent1"/>
+          </a:fillRef>
+          <a:effectRef idx="0">
+            <a:schemeClr val="accent1"/>
+          </a:effectRef>
+          <a:fontRef idx="minor">
+            <a:schemeClr val="lt1"/>
+          </a:fontRef>
+        </p:style>
+        <p:txBody>
+          <a:bodyPr rot="0" spcFirstLastPara="0" vertOverflow="overflow" horzOverflow="overflow" vert="horz" wrap="square" lIns="91440" tIns="45720" rIns="91440" bIns="45720" numCol="1" spcCol="0" rtlCol="0" fromWordArt="0" anchor="ctr" anchorCtr="0" forceAA="0" compatLnSpc="1">
+            <a:prstTxWarp prst="textNoShape">
+              <a:avLst/>
+            </a:prstTxWarp>
+            <a:noAutofit/>
+          </a:bodyPr>
+          <a:lstStyle/>
+          <a:p>
+            <a:pPr algn="ctr"/>
+            <a:endParaRPr lang="en-US"/>
+          </a:p>
+        </p:txBody>
+      </p:sp>
+      <p:sp>
+        <p:nvSpPr>
+          <p:cNvPr id="42" name="Oval 13">
+            <a:extLst>
+              <a:ext uri="{FF2B5EF4-FFF2-40B4-BE49-F238E27FC236}">
+                <a16:creationId xmlns:a16="http://schemas.microsoft.com/office/drawing/2014/main" id="{3CF94A42-720D-4B81-8D24-E4A974DE0225}"/>
+              </a:ext>
+              <a:ext uri="{C183D7F6-B498-43B3-948B-1728B52AA6E4}">
+                <adec:decorative xmlns:adec="http://schemas.microsoft.com/office/drawing/2017/decorative" val="1"/>
+              </a:ext>
+            </a:extLst>
+          </p:cNvPr>
+          <p:cNvSpPr>
+            <a:spLocks noGrp="1" noRot="1" noChangeAspect="1" noMove="1" noResize="1" noEditPoints="1" noAdjustHandles="1" noChangeArrowheads="1" noChangeShapeType="1" noTextEdit="1"/>
+          </p:cNvSpPr>
+          <p:nvPr>
+            <p:extLst>
+              <p:ext uri="{386F3935-93C4-4BCD-93E2-E3B085C9AB24}">
+                <p16:designElem xmlns:p16="http://schemas.microsoft.com/office/powerpoint/2015/main" val="1"/>
+              </p:ext>
+            </p:extLst>
+          </p:nvPr>
+        </p:nvSpPr>
+        <p:spPr>
+          <a:xfrm rot="2700000">
+            <a:off x="987001" y="935623"/>
+            <a:ext cx="107098" cy="466589"/>
+          </a:xfrm>
+          <a:prstGeom prst="ellipse">
+            <a:avLst/>
+          </a:prstGeom>
+          <a:solidFill>
+            <a:schemeClr val="bg2">
+              <a:lumMod val="90000"/>
+              <a:lumOff val="10000"/>
+            </a:schemeClr>
+          </a:solidFill>
+          <a:ln>
+            <a:noFill/>
+          </a:ln>
+          <a:effectLst>
+            <a:innerShdw blurRad="63500" dist="2540000">
+              <a:schemeClr val="accent1">
+                <a:lumMod val="60000"/>
+                <a:lumOff val="40000"/>
+                <a:alpha val="40000"/>
+              </a:schemeClr>
+            </a:innerShdw>
+          </a:effectLst>
+        </p:spPr>
+        <p:style>
+          <a:lnRef idx="2">
+            <a:schemeClr val="accent1">
+              <a:shade val="50000"/>
+            </a:schemeClr>
+          </a:lnRef>
+          <a:fillRef idx="1">
+            <a:schemeClr val="accent1"/>
+          </a:fillRef>
+          <a:effectRef idx="0">
+            <a:schemeClr val="accent1"/>
+          </a:effectRef>
+          <a:fontRef idx="minor">
+            <a:schemeClr val="lt1"/>
+          </a:fontRef>
+        </p:style>
+        <p:txBody>
+          <a:bodyPr rot="0" spcFirstLastPara="0" vertOverflow="overflow" horzOverflow="overflow" vert="horz" wrap="square" lIns="91440" tIns="45720" rIns="91440" bIns="45720" numCol="1" spcCol="0" rtlCol="0" fromWordArt="0" anchor="ctr" anchorCtr="0" forceAA="0" compatLnSpc="1">
+            <a:prstTxWarp prst="textNoShape">
+              <a:avLst/>
+            </a:prstTxWarp>
+            <a:noAutofit/>
+          </a:bodyPr>
+          <a:lstStyle/>
+          <a:p>
+            <a:pPr algn="ctr"/>
+            <a:endParaRPr lang="en-US"/>
+          </a:p>
+        </p:txBody>
+      </p:sp>
+      <p:sp>
+        <p:nvSpPr>
+          <p:cNvPr id="43" name="Freeform: Shape 15">
+            <a:extLst>
+              <a:ext uri="{FF2B5EF4-FFF2-40B4-BE49-F238E27FC236}">
+                <a16:creationId xmlns:a16="http://schemas.microsoft.com/office/drawing/2014/main" id="{E15EB72A-E1B0-4CE0-BB0D-BEFCDF8EFFB0}"/>
+              </a:ext>
+              <a:ext uri="{C183D7F6-B498-43B3-948B-1728B52AA6E4}">
+                <adec:decorative xmlns:adec="http://schemas.microsoft.com/office/drawing/2017/decorative" val="1"/>
+              </a:ext>
+            </a:extLst>
+          </p:cNvPr>
+          <p:cNvSpPr>
+            <a:spLocks noGrp="1" noRot="1" noChangeAspect="1" noMove="1" noResize="1" noEditPoints="1" noAdjustHandles="1" noChangeArrowheads="1" noChangeShapeType="1" noTextEdit="1"/>
+          </p:cNvSpPr>
+          <p:nvPr>
+            <p:extLst>
+              <p:ext uri="{386F3935-93C4-4BCD-93E2-E3B085C9AB24}">
+                <p16:designElem xmlns:p16="http://schemas.microsoft.com/office/powerpoint/2015/main" val="1"/>
+              </p:ext>
+            </p:extLst>
+          </p:nvPr>
+        </p:nvSpPr>
+        <p:spPr>
+          <a:xfrm rot="18900000">
+            <a:off x="315857" y="-131277"/>
+            <a:ext cx="1853969" cy="1042921"/>
+          </a:xfrm>
+          <a:custGeom>
+            <a:avLst/>
+            <a:gdLst>
+              <a:gd name="connsiteX0" fmla="*/ 959154 w 1853969"/>
+              <a:gd name="connsiteY0" fmla="*/ 1828 h 1042921"/>
+              <a:gd name="connsiteX1" fmla="*/ 1842210 w 1853969"/>
+              <a:gd name="connsiteY1" fmla="*/ 884883 h 1042921"/>
+              <a:gd name="connsiteX2" fmla="*/ 1849183 w 1853969"/>
+              <a:gd name="connsiteY2" fmla="*/ 936288 h 1042921"/>
+              <a:gd name="connsiteX3" fmla="*/ 1853969 w 1853969"/>
+              <a:gd name="connsiteY3" fmla="*/ 1042921 h 1042921"/>
+              <a:gd name="connsiteX4" fmla="*/ 1390476 w 1853969"/>
+              <a:gd name="connsiteY4" fmla="*/ 1042921 h 1042921"/>
+              <a:gd name="connsiteX5" fmla="*/ 926984 w 1853969"/>
+              <a:gd name="connsiteY5" fmla="*/ 521461 h 1042921"/>
+              <a:gd name="connsiteX6" fmla="*/ 463493 w 1853969"/>
+              <a:gd name="connsiteY6" fmla="*/ 1042921 h 1042921"/>
+              <a:gd name="connsiteX7" fmla="*/ 0 w 1853969"/>
+              <a:gd name="connsiteY7" fmla="*/ 1042921 h 1042921"/>
+              <a:gd name="connsiteX8" fmla="*/ 926985 w 1853969"/>
+              <a:gd name="connsiteY8" fmla="*/ 0 h 1042921"/>
+            </a:gdLst>
+            <a:ahLst/>
+            <a:cxnLst>
+              <a:cxn ang="0">
+                <a:pos x="connsiteX0" y="connsiteY0"/>
+              </a:cxn>
+              <a:cxn ang="0">
+                <a:pos x="connsiteX1" y="connsiteY1"/>
+              </a:cxn>
+              <a:cxn ang="0">
+                <a:pos x="connsiteX2" y="connsiteY2"/>
+              </a:cxn>
+              <a:cxn ang="0">
+                <a:pos x="connsiteX3" y="connsiteY3"/>
+              </a:cxn>
+              <a:cxn ang="0">
+                <a:pos x="connsiteX4" y="connsiteY4"/>
+              </a:cxn>
+              <a:cxn ang="0">
+                <a:pos x="connsiteX5" y="connsiteY5"/>
+              </a:cxn>
+              <a:cxn ang="0">
+                <a:pos x="connsiteX6" y="connsiteY6"/>
+              </a:cxn>
+              <a:cxn ang="0">
+                <a:pos x="connsiteX7" y="connsiteY7"/>
+              </a:cxn>
+              <a:cxn ang="0">
+                <a:pos x="connsiteX8" y="connsiteY8"/>
+              </a:cxn>
+            </a:cxnLst>
+            <a:rect l="l" t="t" r="r" b="b"/>
+            <a:pathLst>
+              <a:path w="1853969" h="1042921">
+                <a:moveTo>
+                  <a:pt x="959154" y="1828"/>
+                </a:moveTo>
+                <a:lnTo>
+                  <a:pt x="1842210" y="884883"/>
+                </a:lnTo>
+                <a:lnTo>
+                  <a:pt x="1849183" y="936288"/>
+                </a:lnTo>
+                <a:cubicBezTo>
+                  <a:pt x="1852348" y="971348"/>
+                  <a:pt x="1853969" y="1006922"/>
+                  <a:pt x="1853969" y="1042921"/>
+                </a:cubicBezTo>
+                <a:lnTo>
+                  <a:pt x="1390476" y="1042921"/>
+                </a:lnTo>
+                <a:cubicBezTo>
+                  <a:pt x="1390476" y="754927"/>
+                  <a:pt x="1182964" y="521461"/>
+                  <a:pt x="926984" y="521461"/>
+                </a:cubicBezTo>
+                <a:cubicBezTo>
+                  <a:pt x="671005" y="521461"/>
+                  <a:pt x="463493" y="754927"/>
+                  <a:pt x="463493" y="1042921"/>
+                </a:cubicBezTo>
+                <a:lnTo>
+                  <a:pt x="0" y="1042921"/>
+                </a:lnTo>
+                <a:cubicBezTo>
+                  <a:pt x="0" y="466932"/>
+                  <a:pt x="415025" y="0"/>
+                  <a:pt x="926985" y="0"/>
+                </a:cubicBezTo>
+                <a:close/>
+              </a:path>
+            </a:pathLst>
+          </a:custGeom>
+          <a:solidFill>
+            <a:schemeClr val="bg2">
+              <a:lumMod val="50000"/>
+              <a:lumOff val="50000"/>
+              <a:alpha val="20000"/>
+            </a:schemeClr>
+          </a:solidFill>
+          <a:ln>
+            <a:noFill/>
+          </a:ln>
+          <a:effectLst>
+            <a:softEdge rad="190500"/>
+          </a:effectLst>
+        </p:spPr>
+        <p:style>
+          <a:lnRef idx="2">
+            <a:schemeClr val="accent1">
+              <a:shade val="50000"/>
+            </a:schemeClr>
+          </a:lnRef>
+          <a:fillRef idx="1">
+            <a:schemeClr val="accent1"/>
+          </a:fillRef>
+          <a:effectRef idx="0">
+            <a:schemeClr val="accent1"/>
+          </a:effectRef>
+          <a:fontRef idx="minor">
+            <a:schemeClr val="lt1"/>
+          </a:fontRef>
+        </p:style>
+        <p:txBody>
+          <a:bodyPr wrap="square" rtlCol="0" anchor="ctr">
+            <a:noAutofit/>
+          </a:bodyPr>
+          <a:lstStyle/>
+          <a:p>
+            <a:pPr algn="ctr"/>
+            <a:endParaRPr lang="en-US" dirty="0">
+              <a:solidFill>
+                <a:schemeClr val="tx1"/>
+              </a:solidFill>
+            </a:endParaRPr>
+          </a:p>
+        </p:txBody>
+      </p:sp>
+      <p:sp>
+        <p:nvSpPr>
+          <p:cNvPr id="44" name="Oval 17">
+            <a:extLst>
+              <a:ext uri="{FF2B5EF4-FFF2-40B4-BE49-F238E27FC236}">
+                <a16:creationId xmlns:a16="http://schemas.microsoft.com/office/drawing/2014/main" id="{88D9FE19-3EE9-41F7-8054-F2C86DBEB361}"/>
+              </a:ext>
+              <a:ext uri="{C183D7F6-B498-43B3-948B-1728B52AA6E4}">
+                <adec:decorative xmlns:adec="http://schemas.microsoft.com/office/drawing/2017/decorative" val="1"/>
+              </a:ext>
+            </a:extLst>
+          </p:cNvPr>
+          <p:cNvSpPr>
+            <a:spLocks noGrp="1" noRot="1" noChangeAspect="1" noMove="1" noResize="1" noEditPoints="1" noAdjustHandles="1" noChangeArrowheads="1" noChangeShapeType="1" noTextEdit="1"/>
+          </p:cNvSpPr>
+          <p:nvPr>
+            <p:extLst>
+              <p:ext uri="{386F3935-93C4-4BCD-93E2-E3B085C9AB24}">
+                <p16:designElem xmlns:p16="http://schemas.microsoft.com/office/powerpoint/2015/main" val="1"/>
+              </p:ext>
+            </p:extLst>
+          </p:nvPr>
+        </p:nvSpPr>
+        <p:spPr>
+          <a:xfrm>
+            <a:off x="979908" y="4729022"/>
+            <a:ext cx="360000" cy="360000"/>
+          </a:xfrm>
+          <a:prstGeom prst="ellipse">
+            <a:avLst/>
+          </a:prstGeom>
+          <a:gradFill flip="none" rotWithShape="1">
+            <a:gsLst>
+              <a:gs pos="100000">
+                <a:schemeClr val="bg2">
+                  <a:lumMod val="50000"/>
+                  <a:lumOff val="50000"/>
+                </a:schemeClr>
+              </a:gs>
+              <a:gs pos="60000">
+                <a:schemeClr val="bg2"/>
+              </a:gs>
+            </a:gsLst>
+            <a:path path="circle">
+              <a:fillToRect l="100000" b="100000"/>
+            </a:path>
+            <a:tileRect t="-100000" r="-100000"/>
+          </a:gradFill>
+          <a:ln>
+            <a:noFill/>
+          </a:ln>
+          <a:effectLst>
+            <a:innerShdw blurRad="127000" dist="63500" dir="2700000">
+              <a:schemeClr val="accent1">
+                <a:lumMod val="60000"/>
+                <a:lumOff val="40000"/>
+                <a:alpha val="20000"/>
+              </a:schemeClr>
+            </a:innerShdw>
+            <a:softEdge rad="0"/>
+          </a:effectLst>
+        </p:spPr>
+        <p:style>
+          <a:lnRef idx="2">
+            <a:schemeClr val="accent1">
+              <a:shade val="50000"/>
+            </a:schemeClr>
+          </a:lnRef>
+          <a:fillRef idx="1">
+            <a:schemeClr val="accent1"/>
+          </a:fillRef>
+          <a:effectRef idx="0">
+            <a:schemeClr val="accent1"/>
+          </a:effectRef>
+          <a:fontRef idx="minor">
+            <a:schemeClr val="lt1"/>
+          </a:fontRef>
+        </p:style>
+        <p:txBody>
+          <a:bodyPr rot="0" spcFirstLastPara="0" vertOverflow="overflow" horzOverflow="overflow" vert="horz" wrap="square" lIns="91440" tIns="45720" rIns="91440" bIns="45720" numCol="1" spcCol="0" rtlCol="0" fromWordArt="0" anchor="ctr" anchorCtr="0" forceAA="0" compatLnSpc="1">
+            <a:prstTxWarp prst="textNoShape">
+              <a:avLst/>
+            </a:prstTxWarp>
+            <a:noAutofit/>
+          </a:bodyPr>
+          <a:lstStyle/>
+          <a:p>
+            <a:pPr algn="ctr"/>
+            <a:endParaRPr lang="en-US"/>
           </a:p>
         </p:txBody>
       </p:sp>
@@ -14401,21 +14643,435 @@
             <p:ph idx="1"/>
           </p:nvPr>
         </p:nvSpPr>
-        <p:spPr/>
+        <p:spPr>
+          <a:xfrm>
+            <a:off x="3377566" y="3052367"/>
+            <a:ext cx="5418772" cy="3040458"/>
+          </a:xfrm>
+        </p:spPr>
         <p:txBody>
-          <a:bodyPr/>
+          <a:bodyPr anchor="t">
+            <a:normAutofit/>
+          </a:bodyPr>
           <a:lstStyle/>
           <a:p>
             <a:r>
-              <a:rPr lang="fr-FR" dirty="0"/>
+              <a:rPr lang="fr-FR" sz="1600"/>
+              <a:t>NavBar et Footer</a:t>
+            </a:r>
+          </a:p>
+          <a:p>
+            <a:r>
+              <a:rPr lang="fr-FR" sz="1600"/>
               <a:t>Backoffice</a:t>
             </a:r>
           </a:p>
           <a:p>
-            <a:endParaRPr lang="fr-FR" dirty="0"/>
+            <a:endParaRPr lang="fr-FR" sz="1600"/>
           </a:p>
           <a:p>
-            <a:endParaRPr lang="fr-FR" dirty="0"/>
+            <a:endParaRPr lang="fr-FR" sz="1600"/>
+          </a:p>
+        </p:txBody>
+      </p:sp>
+      <p:grpSp>
+        <p:nvGrpSpPr>
+          <p:cNvPr id="20" name="Group 19">
+            <a:extLst>
+              <a:ext uri="{FF2B5EF4-FFF2-40B4-BE49-F238E27FC236}">
+                <a16:creationId xmlns:a16="http://schemas.microsoft.com/office/drawing/2014/main" id="{1D7EF0A0-9237-4001-884B-9E0F5ECE4944}"/>
+              </a:ext>
+              <a:ext uri="{C183D7F6-B498-43B3-948B-1728B52AA6E4}">
+                <adec:decorative xmlns:adec="http://schemas.microsoft.com/office/drawing/2017/decorative" val="1"/>
+              </a:ext>
+            </a:extLst>
+          </p:cNvPr>
+          <p:cNvGrpSpPr>
+            <a:grpSpLocks noGrp="1" noUngrp="1" noRot="1" noChangeAspect="1" noMove="1" noResize="1"/>
+          </p:cNvGrpSpPr>
+          <p:nvPr>
+            <p:extLst>
+              <p:ext uri="{386F3935-93C4-4BCD-93E2-E3B085C9AB24}">
+                <p16:designElem xmlns:p16="http://schemas.microsoft.com/office/powerpoint/2015/main" val="1"/>
+              </p:ext>
+            </p:extLst>
+          </p:nvPr>
+        </p:nvGrpSpPr>
+        <p:grpSpPr>
+          <a:xfrm>
+            <a:off x="8962595" y="3429000"/>
+            <a:ext cx="2679292" cy="2525894"/>
+            <a:chOff x="9469123" y="4029759"/>
+            <a:chExt cx="2679292" cy="2525894"/>
+          </a:xfrm>
+        </p:grpSpPr>
+        <p:sp>
+          <p:nvSpPr>
+            <p:cNvPr id="45" name="Freeform: Shape 20">
+              <a:extLst>
+                <a:ext uri="{FF2B5EF4-FFF2-40B4-BE49-F238E27FC236}">
+                  <a16:creationId xmlns:a16="http://schemas.microsoft.com/office/drawing/2014/main" id="{149490B2-2AF9-4660-9B40-248A345D9532}"/>
+                </a:ext>
+                <a:ext uri="{C183D7F6-B498-43B3-948B-1728B52AA6E4}">
+                  <adec:decorative xmlns:adec="http://schemas.microsoft.com/office/drawing/2017/decorative" val="1"/>
+                </a:ext>
+              </a:extLst>
+            </p:cNvPr>
+            <p:cNvSpPr>
+              <a:spLocks noChangeAspect="1"/>
+            </p:cNvSpPr>
+            <p:nvPr>
+              <p:extLst>
+                <p:ext uri="{386F3935-93C4-4BCD-93E2-E3B085C9AB24}">
+                  <p16:designElem xmlns:p16="http://schemas.microsoft.com/office/powerpoint/2015/main" val="1"/>
+                </p:ext>
+              </p:extLst>
+            </p:nvPr>
+          </p:nvSpPr>
+          <p:spPr>
+            <a:xfrm rot="8100000">
+              <a:off x="9988415" y="4029759"/>
+              <a:ext cx="2160000" cy="2525894"/>
+            </a:xfrm>
+            <a:custGeom>
+              <a:avLst/>
+              <a:gdLst>
+                <a:gd name="connsiteX0" fmla="*/ 540000 w 1080000"/>
+                <a:gd name="connsiteY0" fmla="*/ 0 h 1262947"/>
+                <a:gd name="connsiteX1" fmla="*/ 1080000 w 1080000"/>
+                <a:gd name="connsiteY1" fmla="*/ 931034 h 1262947"/>
+                <a:gd name="connsiteX2" fmla="*/ 1064374 w 1080000"/>
+                <a:gd name="connsiteY2" fmla="*/ 931034 h 1262947"/>
+                <a:gd name="connsiteX3" fmla="*/ 1069029 w 1080000"/>
+                <a:gd name="connsiteY3" fmla="*/ 938533 h 1262947"/>
+                <a:gd name="connsiteX4" fmla="*/ 1080000 w 1080000"/>
+                <a:gd name="connsiteY4" fmla="*/ 992947 h 1262947"/>
+                <a:gd name="connsiteX5" fmla="*/ 540000 w 1080000"/>
+                <a:gd name="connsiteY5" fmla="*/ 1262947 h 1262947"/>
+                <a:gd name="connsiteX6" fmla="*/ 0 w 1080000"/>
+                <a:gd name="connsiteY6" fmla="*/ 992947 h 1262947"/>
+                <a:gd name="connsiteX7" fmla="*/ 10971 w 1080000"/>
+                <a:gd name="connsiteY7" fmla="*/ 938533 h 1262947"/>
+                <a:gd name="connsiteX8" fmla="*/ 15626 w 1080000"/>
+                <a:gd name="connsiteY8" fmla="*/ 931034 h 1262947"/>
+                <a:gd name="connsiteX9" fmla="*/ 0 w 1080000"/>
+                <a:gd name="connsiteY9" fmla="*/ 931034 h 1262947"/>
+                <a:gd name="connsiteX0" fmla="*/ 540000 w 1080000"/>
+                <a:gd name="connsiteY0" fmla="*/ 0 h 1262947"/>
+                <a:gd name="connsiteX1" fmla="*/ 1080000 w 1080000"/>
+                <a:gd name="connsiteY1" fmla="*/ 931034 h 1262947"/>
+                <a:gd name="connsiteX2" fmla="*/ 1064374 w 1080000"/>
+                <a:gd name="connsiteY2" fmla="*/ 931034 h 1262947"/>
+                <a:gd name="connsiteX3" fmla="*/ 1069029 w 1080000"/>
+                <a:gd name="connsiteY3" fmla="*/ 938533 h 1262947"/>
+                <a:gd name="connsiteX4" fmla="*/ 1080000 w 1080000"/>
+                <a:gd name="connsiteY4" fmla="*/ 992947 h 1262947"/>
+                <a:gd name="connsiteX5" fmla="*/ 540000 w 1080000"/>
+                <a:gd name="connsiteY5" fmla="*/ 1262947 h 1262947"/>
+                <a:gd name="connsiteX6" fmla="*/ 0 w 1080000"/>
+                <a:gd name="connsiteY6" fmla="*/ 992947 h 1262947"/>
+                <a:gd name="connsiteX7" fmla="*/ 10971 w 1080000"/>
+                <a:gd name="connsiteY7" fmla="*/ 938533 h 1262947"/>
+                <a:gd name="connsiteX8" fmla="*/ 15626 w 1080000"/>
+                <a:gd name="connsiteY8" fmla="*/ 931034 h 1262947"/>
+                <a:gd name="connsiteX9" fmla="*/ 540000 w 1080000"/>
+                <a:gd name="connsiteY9" fmla="*/ 0 h 1262947"/>
+                <a:gd name="connsiteX0" fmla="*/ 540000 w 1080000"/>
+                <a:gd name="connsiteY0" fmla="*/ 0 h 1262947"/>
+                <a:gd name="connsiteX1" fmla="*/ 1064374 w 1080000"/>
+                <a:gd name="connsiteY1" fmla="*/ 931034 h 1262947"/>
+                <a:gd name="connsiteX2" fmla="*/ 1069029 w 1080000"/>
+                <a:gd name="connsiteY2" fmla="*/ 938533 h 1262947"/>
+                <a:gd name="connsiteX3" fmla="*/ 1080000 w 1080000"/>
+                <a:gd name="connsiteY3" fmla="*/ 992947 h 1262947"/>
+                <a:gd name="connsiteX4" fmla="*/ 540000 w 1080000"/>
+                <a:gd name="connsiteY4" fmla="*/ 1262947 h 1262947"/>
+                <a:gd name="connsiteX5" fmla="*/ 0 w 1080000"/>
+                <a:gd name="connsiteY5" fmla="*/ 992947 h 1262947"/>
+                <a:gd name="connsiteX6" fmla="*/ 10971 w 1080000"/>
+                <a:gd name="connsiteY6" fmla="*/ 938533 h 1262947"/>
+                <a:gd name="connsiteX7" fmla="*/ 15626 w 1080000"/>
+                <a:gd name="connsiteY7" fmla="*/ 931034 h 1262947"/>
+                <a:gd name="connsiteX8" fmla="*/ 540000 w 1080000"/>
+                <a:gd name="connsiteY8" fmla="*/ 0 h 1262947"/>
+              </a:gdLst>
+              <a:ahLst/>
+              <a:cxnLst>
+                <a:cxn ang="0">
+                  <a:pos x="connsiteX0" y="connsiteY0"/>
+                </a:cxn>
+                <a:cxn ang="0">
+                  <a:pos x="connsiteX1" y="connsiteY1"/>
+                </a:cxn>
+                <a:cxn ang="0">
+                  <a:pos x="connsiteX2" y="connsiteY2"/>
+                </a:cxn>
+                <a:cxn ang="0">
+                  <a:pos x="connsiteX3" y="connsiteY3"/>
+                </a:cxn>
+                <a:cxn ang="0">
+                  <a:pos x="connsiteX4" y="connsiteY4"/>
+                </a:cxn>
+                <a:cxn ang="0">
+                  <a:pos x="connsiteX5" y="connsiteY5"/>
+                </a:cxn>
+                <a:cxn ang="0">
+                  <a:pos x="connsiteX6" y="connsiteY6"/>
+                </a:cxn>
+                <a:cxn ang="0">
+                  <a:pos x="connsiteX7" y="connsiteY7"/>
+                </a:cxn>
+                <a:cxn ang="0">
+                  <a:pos x="connsiteX8" y="connsiteY8"/>
+                </a:cxn>
+              </a:cxnLst>
+              <a:rect l="l" t="t" r="r" b="b"/>
+              <a:pathLst>
+                <a:path w="1080000" h="1262947">
+                  <a:moveTo>
+                    <a:pt x="540000" y="0"/>
+                  </a:moveTo>
+                  <a:lnTo>
+                    <a:pt x="1064374" y="931034"/>
+                  </a:lnTo>
+                  <a:lnTo>
+                    <a:pt x="1069029" y="938533"/>
+                  </a:lnTo>
+                  <a:cubicBezTo>
+                    <a:pt x="1076223" y="956109"/>
+                    <a:pt x="1080000" y="974307"/>
+                    <a:pt x="1080000" y="992947"/>
+                  </a:cubicBezTo>
+                  <a:cubicBezTo>
+                    <a:pt x="1080000" y="1142064"/>
+                    <a:pt x="838234" y="1262947"/>
+                    <a:pt x="540000" y="1262947"/>
+                  </a:cubicBezTo>
+                  <a:cubicBezTo>
+                    <a:pt x="241766" y="1262947"/>
+                    <a:pt x="0" y="1142064"/>
+                    <a:pt x="0" y="992947"/>
+                  </a:cubicBezTo>
+                  <a:cubicBezTo>
+                    <a:pt x="0" y="974307"/>
+                    <a:pt x="3778" y="956109"/>
+                    <a:pt x="10971" y="938533"/>
+                  </a:cubicBezTo>
+                  <a:lnTo>
+                    <a:pt x="15626" y="931034"/>
+                  </a:lnTo>
+                  <a:lnTo>
+                    <a:pt x="540000" y="0"/>
+                  </a:lnTo>
+                  <a:close/>
+                </a:path>
+              </a:pathLst>
+            </a:custGeom>
+            <a:gradFill>
+              <a:gsLst>
+                <a:gs pos="60000">
+                  <a:schemeClr val="bg2">
+                    <a:lumMod val="90000"/>
+                    <a:lumOff val="10000"/>
+                  </a:schemeClr>
+                </a:gs>
+                <a:gs pos="30000">
+                  <a:schemeClr val="bg2">
+                    <a:lumMod val="90000"/>
+                    <a:lumOff val="10000"/>
+                  </a:schemeClr>
+                </a:gs>
+                <a:gs pos="40000">
+                  <a:schemeClr val="bg2">
+                    <a:lumMod val="80000"/>
+                    <a:lumOff val="20000"/>
+                  </a:schemeClr>
+                </a:gs>
+                <a:gs pos="100000">
+                  <a:schemeClr val="bg2"/>
+                </a:gs>
+              </a:gsLst>
+              <a:lin ang="600000" scaled="0"/>
+            </a:gradFill>
+            <a:ln>
+              <a:noFill/>
+            </a:ln>
+            <a:effectLst>
+              <a:innerShdw blurRad="508000" dist="203200" dir="7320000">
+                <a:schemeClr val="accent1">
+                  <a:lumMod val="60000"/>
+                  <a:lumOff val="40000"/>
+                </a:schemeClr>
+              </a:innerShdw>
+            </a:effectLst>
+          </p:spPr>
+          <p:style>
+            <a:lnRef idx="2">
+              <a:schemeClr val="accent1">
+                <a:shade val="50000"/>
+              </a:schemeClr>
+            </a:lnRef>
+            <a:fillRef idx="1">
+              <a:schemeClr val="accent1"/>
+            </a:fillRef>
+            <a:effectRef idx="0">
+              <a:schemeClr val="accent1"/>
+            </a:effectRef>
+            <a:fontRef idx="minor">
+              <a:schemeClr val="lt1"/>
+            </a:fontRef>
+          </p:style>
+          <p:txBody>
+            <a:bodyPr rot="0" spcFirstLastPara="0" vertOverflow="overflow" horzOverflow="overflow" vert="horz" wrap="square" lIns="91440" tIns="45720" rIns="91440" bIns="45720" numCol="1" spcCol="0" rtlCol="0" fromWordArt="0" anchor="ctr" anchorCtr="0" forceAA="0" compatLnSpc="1">
+              <a:prstTxWarp prst="textNoShape">
+                <a:avLst/>
+              </a:prstTxWarp>
+              <a:noAutofit/>
+            </a:bodyPr>
+            <a:lstStyle/>
+            <a:p>
+              <a:pPr algn="ctr"/>
+              <a:endParaRPr lang="en-US"/>
+            </a:p>
+          </p:txBody>
+        </p:sp>
+        <p:sp>
+          <p:nvSpPr>
+            <p:cNvPr id="46" name="Oval 21">
+              <a:extLst>
+                <a:ext uri="{FF2B5EF4-FFF2-40B4-BE49-F238E27FC236}">
+                  <a16:creationId xmlns:a16="http://schemas.microsoft.com/office/drawing/2014/main" id="{0364A160-6ADA-4260-92B9-9BD8B6681296}"/>
+                </a:ext>
+                <a:ext uri="{C183D7F6-B498-43B3-948B-1728B52AA6E4}">
+                  <adec:decorative xmlns:adec="http://schemas.microsoft.com/office/drawing/2017/decorative" val="1"/>
+                </a:ext>
+              </a:extLst>
+            </p:cNvPr>
+            <p:cNvSpPr/>
+            <p:nvPr>
+              <p:extLst>
+                <p:ext uri="{386F3935-93C4-4BCD-93E2-E3B085C9AB24}">
+                  <p16:designElem xmlns:p16="http://schemas.microsoft.com/office/powerpoint/2015/main" val="1"/>
+                </p:ext>
+              </p:extLst>
+            </p:nvPr>
+          </p:nvSpPr>
+          <p:spPr>
+            <a:xfrm rot="13500000">
+              <a:off x="10009123" y="3693413"/>
+              <a:ext cx="1080000" cy="2160000"/>
+            </a:xfrm>
+            <a:prstGeom prst="ellipse">
+              <a:avLst/>
+            </a:prstGeom>
+            <a:solidFill>
+              <a:schemeClr val="bg2">
+                <a:lumMod val="90000"/>
+                <a:lumOff val="10000"/>
+              </a:schemeClr>
+            </a:solidFill>
+            <a:ln>
+              <a:noFill/>
+            </a:ln>
+            <a:effectLst>
+              <a:innerShdw blurRad="1270000" dist="2540000">
+                <a:schemeClr val="accent1">
+                  <a:lumMod val="60000"/>
+                  <a:lumOff val="40000"/>
+                  <a:alpha val="0"/>
+                </a:schemeClr>
+              </a:innerShdw>
+            </a:effectLst>
+          </p:spPr>
+          <p:style>
+            <a:lnRef idx="2">
+              <a:schemeClr val="accent1">
+                <a:shade val="50000"/>
+              </a:schemeClr>
+            </a:lnRef>
+            <a:fillRef idx="1">
+              <a:schemeClr val="accent1"/>
+            </a:fillRef>
+            <a:effectRef idx="0">
+              <a:schemeClr val="accent1"/>
+            </a:effectRef>
+            <a:fontRef idx="minor">
+              <a:schemeClr val="lt1"/>
+            </a:fontRef>
+          </p:style>
+          <p:txBody>
+            <a:bodyPr rot="0" spcFirstLastPara="0" vertOverflow="overflow" horzOverflow="overflow" vert="horz" wrap="square" lIns="91440" tIns="45720" rIns="91440" bIns="45720" numCol="1" spcCol="0" rtlCol="0" fromWordArt="0" anchor="ctr" anchorCtr="0" forceAA="0" compatLnSpc="1">
+              <a:prstTxWarp prst="textNoShape">
+                <a:avLst/>
+              </a:prstTxWarp>
+              <a:noAutofit/>
+            </a:bodyPr>
+            <a:lstStyle/>
+            <a:p>
+              <a:pPr algn="ctr"/>
+              <a:endParaRPr lang="en-US"/>
+            </a:p>
+          </p:txBody>
+        </p:sp>
+      </p:grpSp>
+      <p:sp>
+        <p:nvSpPr>
+          <p:cNvPr id="47" name="Oval 46">
+            <a:extLst>
+              <a:ext uri="{FF2B5EF4-FFF2-40B4-BE49-F238E27FC236}">
+                <a16:creationId xmlns:a16="http://schemas.microsoft.com/office/drawing/2014/main" id="{775ECED9-B192-4892-A822-01EA5C41F5AD}"/>
+              </a:ext>
+            </a:extLst>
+          </p:cNvPr>
+          <p:cNvSpPr/>
+          <p:nvPr/>
+        </p:nvSpPr>
+        <p:spPr>
+          <a:xfrm>
+            <a:off x="221942" y="6275609"/>
+            <a:ext cx="360960" cy="364888"/>
+          </a:xfrm>
+          <a:prstGeom prst="ellipse">
+            <a:avLst/>
+          </a:prstGeom>
+          <a:solidFill>
+            <a:schemeClr val="tx1"/>
+          </a:solidFill>
+          <a:ln>
+            <a:solidFill>
+              <a:schemeClr val="tx1"/>
+            </a:solidFill>
+          </a:ln>
+        </p:spPr>
+        <p:style>
+          <a:lnRef idx="2">
+            <a:schemeClr val="accent1">
+              <a:shade val="50000"/>
+            </a:schemeClr>
+          </a:lnRef>
+          <a:fillRef idx="1">
+            <a:schemeClr val="accent1"/>
+          </a:fillRef>
+          <a:effectRef idx="0">
+            <a:schemeClr val="accent1"/>
+          </a:effectRef>
+          <a:fontRef idx="minor">
+            <a:schemeClr val="lt1"/>
+          </a:fontRef>
+        </p:style>
+        <p:txBody>
+          <a:bodyPr rtlCol="0" anchor="ctr"/>
+          <a:lstStyle/>
+          <a:p>
+            <a:pPr algn="ctr"/>
+            <a:r>
+              <a:rPr lang="fr-FR" dirty="0">
+                <a:solidFill>
+                  <a:schemeClr val="bg1"/>
+                </a:solidFill>
+              </a:rPr>
+              <a:t>4</a:t>
+            </a:r>
           </a:p>
         </p:txBody>
       </p:sp>
@@ -14507,6 +15163,67 @@
             <a:r>
               <a:rPr lang="fr-FR" dirty="0"/>
               <a:t>Durée correcte</a:t>
+            </a:r>
+          </a:p>
+        </p:txBody>
+      </p:sp>
+      <p:sp>
+        <p:nvSpPr>
+          <p:cNvPr id="4" name="Oval 3">
+            <a:extLst>
+              <a:ext uri="{FF2B5EF4-FFF2-40B4-BE49-F238E27FC236}">
+                <a16:creationId xmlns:a16="http://schemas.microsoft.com/office/drawing/2014/main" id="{E7F18090-77E6-4085-9307-D636A56149B5}"/>
+              </a:ext>
+            </a:extLst>
+          </p:cNvPr>
+          <p:cNvSpPr/>
+          <p:nvPr/>
+        </p:nvSpPr>
+        <p:spPr>
+          <a:xfrm>
+            <a:off x="221942" y="6275609"/>
+            <a:ext cx="360960" cy="364888"/>
+          </a:xfrm>
+          <a:prstGeom prst="ellipse">
+            <a:avLst/>
+          </a:prstGeom>
+          <a:solidFill>
+            <a:schemeClr val="tx1"/>
+          </a:solidFill>
+          <a:ln>
+            <a:solidFill>
+              <a:schemeClr val="tx1"/>
+            </a:solidFill>
+          </a:ln>
+        </p:spPr>
+        <p:style>
+          <a:lnRef idx="2">
+            <a:schemeClr val="accent1">
+              <a:shade val="50000"/>
+            </a:schemeClr>
+          </a:lnRef>
+          <a:fillRef idx="1">
+            <a:schemeClr val="accent1"/>
+          </a:fillRef>
+          <a:effectRef idx="0">
+            <a:schemeClr val="accent1"/>
+          </a:effectRef>
+          <a:fontRef idx="minor">
+            <a:schemeClr val="lt1"/>
+          </a:fontRef>
+        </p:style>
+        <p:txBody>
+          <a:bodyPr rtlCol="0" anchor="ctr"/>
+          <a:lstStyle/>
+          <a:p>
+            <a:pPr algn="ctr"/>
+            <a:r>
+              <a:rPr lang="fr-FR" dirty="0">
+                <a:solidFill>
+                  <a:schemeClr val="bg1"/>
+                </a:solidFill>
+              </a:rPr>
+              <a:t>5</a:t>
             </a:r>
           </a:p>
         </p:txBody>

</xml_diff>